<commit_message>
PredictiveModeling e Probability_Statistics: spostamento file
</commit_message>
<xml_diff>
--- a/Probability_Statistics/Probability_Statistics_intro.pptx
+++ b/Probability_Statistics/Probability_Statistics_intro.pptx
@@ -23,11 +23,14 @@
     <p:sldId id="274" r:id="rId17"/>
     <p:sldId id="273" r:id="rId18"/>
     <p:sldId id="282" r:id="rId19"/>
-    <p:sldId id="276" r:id="rId20"/>
-    <p:sldId id="277" r:id="rId21"/>
-    <p:sldId id="278" r:id="rId22"/>
-    <p:sldId id="283" r:id="rId23"/>
-    <p:sldId id="261" r:id="rId24"/>
+    <p:sldId id="289" r:id="rId20"/>
+    <p:sldId id="290" r:id="rId21"/>
+    <p:sldId id="291" r:id="rId22"/>
+    <p:sldId id="276" r:id="rId23"/>
+    <p:sldId id="277" r:id="rId24"/>
+    <p:sldId id="278" r:id="rId25"/>
+    <p:sldId id="283" r:id="rId26"/>
+    <p:sldId id="261" r:id="rId27"/>
   </p:sldIdLst>
   <p:sldSz cx="12192000" cy="6858000"/>
   <p:notesSz cx="6858000" cy="9144000"/>
@@ -443,7 +446,7 @@
           <a:p>
             <a:fld id="{C369705D-41FE-4C2A-AD94-64E2E5127CB0}" type="datetimeFigureOut">
               <a:rPr lang="it-IT" smtClean="0"/>
-              <a:t>15/05/2022</a:t>
+              <a:t>16/05/2022</a:t>
             </a:fld>
             <a:endParaRPr lang="it-IT"/>
           </a:p>
@@ -643,7 +646,7 @@
           <a:p>
             <a:fld id="{C369705D-41FE-4C2A-AD94-64E2E5127CB0}" type="datetimeFigureOut">
               <a:rPr lang="it-IT" smtClean="0"/>
-              <a:t>15/05/2022</a:t>
+              <a:t>16/05/2022</a:t>
             </a:fld>
             <a:endParaRPr lang="it-IT"/>
           </a:p>
@@ -853,7 +856,7 @@
           <a:p>
             <a:fld id="{C369705D-41FE-4C2A-AD94-64E2E5127CB0}" type="datetimeFigureOut">
               <a:rPr lang="it-IT" smtClean="0"/>
-              <a:t>15/05/2022</a:t>
+              <a:t>16/05/2022</a:t>
             </a:fld>
             <a:endParaRPr lang="it-IT"/>
           </a:p>
@@ -1053,7 +1056,7 @@
           <a:p>
             <a:fld id="{C369705D-41FE-4C2A-AD94-64E2E5127CB0}" type="datetimeFigureOut">
               <a:rPr lang="it-IT" smtClean="0"/>
-              <a:t>15/05/2022</a:t>
+              <a:t>16/05/2022</a:t>
             </a:fld>
             <a:endParaRPr lang="it-IT"/>
           </a:p>
@@ -1329,7 +1332,7 @@
           <a:p>
             <a:fld id="{C369705D-41FE-4C2A-AD94-64E2E5127CB0}" type="datetimeFigureOut">
               <a:rPr lang="it-IT" smtClean="0"/>
-              <a:t>15/05/2022</a:t>
+              <a:t>16/05/2022</a:t>
             </a:fld>
             <a:endParaRPr lang="it-IT"/>
           </a:p>
@@ -1597,7 +1600,7 @@
           <a:p>
             <a:fld id="{C369705D-41FE-4C2A-AD94-64E2E5127CB0}" type="datetimeFigureOut">
               <a:rPr lang="it-IT" smtClean="0"/>
-              <a:t>15/05/2022</a:t>
+              <a:t>16/05/2022</a:t>
             </a:fld>
             <a:endParaRPr lang="it-IT"/>
           </a:p>
@@ -2012,7 +2015,7 @@
           <a:p>
             <a:fld id="{C369705D-41FE-4C2A-AD94-64E2E5127CB0}" type="datetimeFigureOut">
               <a:rPr lang="it-IT" smtClean="0"/>
-              <a:t>15/05/2022</a:t>
+              <a:t>16/05/2022</a:t>
             </a:fld>
             <a:endParaRPr lang="it-IT"/>
           </a:p>
@@ -2154,7 +2157,7 @@
           <a:p>
             <a:fld id="{C369705D-41FE-4C2A-AD94-64E2E5127CB0}" type="datetimeFigureOut">
               <a:rPr lang="it-IT" smtClean="0"/>
-              <a:t>15/05/2022</a:t>
+              <a:t>16/05/2022</a:t>
             </a:fld>
             <a:endParaRPr lang="it-IT"/>
           </a:p>
@@ -2267,7 +2270,7 @@
           <a:p>
             <a:fld id="{C369705D-41FE-4C2A-AD94-64E2E5127CB0}" type="datetimeFigureOut">
               <a:rPr lang="it-IT" smtClean="0"/>
-              <a:t>15/05/2022</a:t>
+              <a:t>16/05/2022</a:t>
             </a:fld>
             <a:endParaRPr lang="it-IT"/>
           </a:p>
@@ -2580,7 +2583,7 @@
           <a:p>
             <a:fld id="{C369705D-41FE-4C2A-AD94-64E2E5127CB0}" type="datetimeFigureOut">
               <a:rPr lang="it-IT" smtClean="0"/>
-              <a:t>15/05/2022</a:t>
+              <a:t>16/05/2022</a:t>
             </a:fld>
             <a:endParaRPr lang="it-IT"/>
           </a:p>
@@ -2869,7 +2872,7 @@
           <a:p>
             <a:fld id="{C369705D-41FE-4C2A-AD94-64E2E5127CB0}" type="datetimeFigureOut">
               <a:rPr lang="it-IT" smtClean="0"/>
-              <a:t>15/05/2022</a:t>
+              <a:t>16/05/2022</a:t>
             </a:fld>
             <a:endParaRPr lang="it-IT"/>
           </a:p>
@@ -3112,7 +3115,7 @@
           <a:p>
             <a:fld id="{C369705D-41FE-4C2A-AD94-64E2E5127CB0}" type="datetimeFigureOut">
               <a:rPr lang="it-IT" smtClean="0"/>
-              <a:t>15/05/2022</a:t>
+              <a:t>16/05/2022</a:t>
             </a:fld>
             <a:endParaRPr lang="it-IT"/>
           </a:p>
@@ -4850,8 +4853,8 @@
           </a:p>
         </p:txBody>
       </p:sp>
-      <mc:AlternateContent xmlns:mc="http://schemas.openxmlformats.org/markup-compatibility/2006">
-        <mc:Choice xmlns:a14="http://schemas.microsoft.com/office/drawing/2010/main" Requires="a14">
+      <mc:AlternateContent xmlns:mc="http://schemas.openxmlformats.org/markup-compatibility/2006" xmlns:a14="http://schemas.microsoft.com/office/drawing/2010/main">
+        <mc:Choice Requires="a14">
           <p:graphicFrame>
             <p:nvGraphicFramePr>
               <p:cNvPr id="6" name="Table 6">
@@ -5761,7 +5764,7 @@
             </a:graphic>
           </p:graphicFrame>
         </mc:Choice>
-        <mc:Fallback>
+        <mc:Fallback xmlns="">
           <p:graphicFrame>
             <p:nvGraphicFramePr>
               <p:cNvPr id="6" name="Table 6">
@@ -6123,7 +6126,7 @@
                   <a:schemeClr val="accent2"/>
                 </a:solidFill>
               </a:rPr>
-              <a:t>σ = 10</a:t>
+              <a:t>σ = 2</a:t>
             </a:r>
           </a:p>
         </p:txBody>
@@ -6193,8 +6196,8 @@
           </a:p>
         </p:txBody>
       </p:sp>
-      <mc:AlternateContent xmlns:mc="http://schemas.openxmlformats.org/markup-compatibility/2006">
-        <mc:Choice xmlns:a14="http://schemas.microsoft.com/office/drawing/2010/main" Requires="a14">
+      <mc:AlternateContent xmlns:mc="http://schemas.openxmlformats.org/markup-compatibility/2006" xmlns:a14="http://schemas.microsoft.com/office/drawing/2010/main">
+        <mc:Choice Requires="a14">
           <p:sp>
             <p:nvSpPr>
               <p:cNvPr id="6" name="TextBox 5">
@@ -6447,7 +6450,7 @@
             </p:txBody>
           </p:sp>
         </mc:Choice>
-        <mc:Fallback>
+        <mc:Fallback xmlns="">
           <p:sp>
             <p:nvSpPr>
               <p:cNvPr id="6" name="TextBox 5">
@@ -6608,8 +6611,8 @@
           </a:p>
         </p:txBody>
       </p:sp>
-      <mc:AlternateContent xmlns:mc="http://schemas.openxmlformats.org/markup-compatibility/2006">
-        <mc:Choice xmlns:a14="http://schemas.microsoft.com/office/drawing/2010/main" Requires="a14">
+      <mc:AlternateContent xmlns:mc="http://schemas.openxmlformats.org/markup-compatibility/2006" xmlns:a14="http://schemas.microsoft.com/office/drawing/2010/main">
+        <mc:Choice Requires="a14">
           <p:sp>
             <p:nvSpPr>
               <p:cNvPr id="10" name="TextBox 9">
@@ -6772,7 +6775,7 @@
             </p:txBody>
           </p:sp>
         </mc:Choice>
-        <mc:Fallback>
+        <mc:Fallback xmlns="">
           <p:sp>
             <p:nvSpPr>
               <p:cNvPr id="10" name="TextBox 9">
@@ -9845,171 +9848,6 @@
           </p:sp>
         </mc:Fallback>
       </mc:AlternateContent>
-      <p:sp>
-        <p:nvSpPr>
-          <p:cNvPr id="10" name="TextBox 9">
-            <a:extLst>
-              <a:ext uri="{FF2B5EF4-FFF2-40B4-BE49-F238E27FC236}">
-                <a16:creationId xmlns:a16="http://schemas.microsoft.com/office/drawing/2014/main" id="{93338E2D-2559-287D-F975-A9F3FB0FC275}"/>
-              </a:ext>
-            </a:extLst>
-          </p:cNvPr>
-          <p:cNvSpPr txBox="1"/>
-          <p:nvPr/>
-        </p:nvSpPr>
-        <p:spPr>
-          <a:xfrm>
-            <a:off x="391413" y="5601020"/>
-            <a:ext cx="5734134" cy="861774"/>
-          </a:xfrm>
-          <a:prstGeom prst="rect">
-            <a:avLst/>
-          </a:prstGeom>
-          <a:noFill/>
-        </p:spPr>
-        <p:txBody>
-          <a:bodyPr wrap="none" rtlCol="0">
-            <a:spAutoFit/>
-          </a:bodyPr>
-          <a:lstStyle/>
-          <a:p>
-            <a:r>
-              <a:rPr lang="it-IT" sz="1600" b="1" dirty="0"/>
-              <a:t>Confidence </a:t>
-            </a:r>
-            <a:r>
-              <a:rPr lang="it-IT" sz="1600" b="1" dirty="0" err="1"/>
-              <a:t>interval</a:t>
-            </a:r>
-            <a:r>
-              <a:rPr lang="it-IT" sz="1600" dirty="0"/>
-              <a:t> </a:t>
-            </a:r>
-            <a:r>
-              <a:rPr lang="it-IT" sz="1600" dirty="0" err="1"/>
-              <a:t>provides</a:t>
-            </a:r>
-            <a:r>
-              <a:rPr lang="it-IT" sz="1600" dirty="0"/>
-              <a:t> a range </a:t>
-            </a:r>
-            <a:r>
-              <a:rPr lang="it-IT" sz="1600" dirty="0" err="1"/>
-              <a:t>that</a:t>
-            </a:r>
-            <a:r>
-              <a:rPr lang="it-IT" sz="1600" dirty="0"/>
-              <a:t> </a:t>
-            </a:r>
-            <a:r>
-              <a:rPr lang="it-IT" sz="1600" dirty="0" err="1"/>
-              <a:t>is</a:t>
-            </a:r>
-            <a:r>
-              <a:rPr lang="it-IT" sz="1600" dirty="0"/>
-              <a:t> </a:t>
-            </a:r>
-            <a:r>
-              <a:rPr lang="it-IT" sz="1600" dirty="0" err="1"/>
-              <a:t>likely</a:t>
-            </a:r>
-            <a:r>
-              <a:rPr lang="it-IT" sz="1600" dirty="0"/>
-              <a:t> to </a:t>
-            </a:r>
-            <a:r>
-              <a:rPr lang="it-IT" sz="1600" dirty="0" err="1"/>
-              <a:t>contain</a:t>
-            </a:r>
-            <a:endParaRPr lang="it-IT" sz="1600" dirty="0"/>
-          </a:p>
-          <a:p>
-            <a:r>
-              <a:rPr lang="it-IT" sz="1600" dirty="0"/>
-              <a:t> the </a:t>
-            </a:r>
-            <a:r>
-              <a:rPr lang="it-IT" sz="1600" dirty="0" err="1"/>
-              <a:t>unknown</a:t>
-            </a:r>
-            <a:r>
-              <a:rPr lang="it-IT" sz="1600" dirty="0"/>
-              <a:t> </a:t>
-            </a:r>
-            <a:r>
-              <a:rPr lang="it-IT" sz="1600" dirty="0" err="1"/>
-              <a:t>value</a:t>
-            </a:r>
-            <a:r>
-              <a:rPr lang="it-IT" sz="1600" dirty="0"/>
-              <a:t> and a degree of confidence (</a:t>
-            </a:r>
-            <a:r>
-              <a:rPr lang="it-IT" sz="1600" b="1" dirty="0"/>
-              <a:t>confidence </a:t>
-            </a:r>
-            <a:r>
-              <a:rPr lang="it-IT" sz="1600" b="1" dirty="0" err="1"/>
-              <a:t>level</a:t>
-            </a:r>
-            <a:r>
-              <a:rPr lang="it-IT" sz="1600" dirty="0"/>
-              <a:t>) </a:t>
-            </a:r>
-          </a:p>
-          <a:p>
-            <a:r>
-              <a:rPr lang="it-IT" sz="1600" dirty="0" err="1"/>
-              <a:t>that</a:t>
-            </a:r>
-            <a:r>
-              <a:rPr lang="it-IT" sz="1600" dirty="0"/>
-              <a:t> the </a:t>
-            </a:r>
-            <a:r>
-              <a:rPr lang="it-IT" sz="1600" dirty="0" err="1"/>
-              <a:t>unknown</a:t>
-            </a:r>
-            <a:r>
-              <a:rPr lang="it-IT" sz="1600" dirty="0"/>
-              <a:t> </a:t>
-            </a:r>
-            <a:r>
-              <a:rPr lang="it-IT" sz="1600" dirty="0" err="1"/>
-              <a:t>value</a:t>
-            </a:r>
-            <a:r>
-              <a:rPr lang="it-IT" sz="1600" dirty="0"/>
-              <a:t> </a:t>
-            </a:r>
-            <a:r>
-              <a:rPr lang="it-IT" sz="1600" dirty="0" err="1"/>
-              <a:t>lies</a:t>
-            </a:r>
-            <a:r>
-              <a:rPr lang="it-IT" sz="1600" dirty="0"/>
-              <a:t> </a:t>
-            </a:r>
-            <a:r>
-              <a:rPr lang="it-IT" sz="1600" dirty="0" err="1"/>
-              <a:t>within</a:t>
-            </a:r>
-            <a:r>
-              <a:rPr lang="it-IT" sz="1600" dirty="0"/>
-              <a:t> </a:t>
-            </a:r>
-            <a:r>
-              <a:rPr lang="it-IT" sz="1600" dirty="0" err="1"/>
-              <a:t>that</a:t>
-            </a:r>
-            <a:r>
-              <a:rPr lang="it-IT" sz="1600" dirty="0"/>
-              <a:t> range.</a:t>
-            </a:r>
-            <a:endParaRPr lang="en-GB" sz="1600" dirty="0"/>
-          </a:p>
-        </p:txBody>
-      </p:sp>
     </p:spTree>
     <p:extLst>
       <p:ext uri="{BB962C8B-B14F-4D97-AF65-F5344CB8AC3E}">
@@ -10055,7 +9893,7 @@
         <p:spPr>
           <a:xfrm>
             <a:off x="503853" y="531845"/>
-            <a:ext cx="11243388" cy="1846659"/>
+            <a:ext cx="11243388" cy="954107"/>
           </a:xfrm>
           <a:prstGeom prst="rect">
             <a:avLst/>
@@ -10070,617 +9908,23 @@
           <a:p>
             <a:r>
               <a:rPr lang="en-GB" sz="2400" b="1" dirty="0"/>
-              <a:t>Central limit theorem</a:t>
-            </a:r>
-          </a:p>
-          <a:p>
-            <a:endParaRPr lang="en-GB" b="1" dirty="0"/>
-          </a:p>
-          <a:p>
-            <a:pPr marL="285750" indent="-285750">
-              <a:buFont typeface="Arial" panose="020B0604020202020204" pitchFamily="34" charset="0"/>
-              <a:buChar char="•"/>
-            </a:pPr>
-            <a:r>
-              <a:rPr lang="en-GB" dirty="0"/>
-              <a:t>Given</a:t>
-            </a:r>
-            <a:r>
-              <a:rPr lang="en-GB" b="1" dirty="0"/>
-              <a:t> </a:t>
-            </a:r>
-            <a:r>
-              <a:rPr lang="en-GB" dirty="0"/>
-              <a:t>a set of sufficiently large samples drawn from the same population, the means of the samples will be approximately normally distributed.</a:t>
-            </a:r>
-          </a:p>
-          <a:p>
-            <a:pPr marL="285750" indent="-285750">
-              <a:buFont typeface="Arial" panose="020B0604020202020204" pitchFamily="34" charset="0"/>
-              <a:buChar char="•"/>
-            </a:pPr>
-            <a:r>
-              <a:rPr lang="en-GB" dirty="0"/>
-              <a:t>The normal distribution will have a mean close to the mean of the population.</a:t>
-            </a:r>
-          </a:p>
-          <a:p>
-            <a:pPr marL="285750" indent="-285750">
-              <a:buFont typeface="Arial" panose="020B0604020202020204" pitchFamily="34" charset="0"/>
-              <a:buChar char="•"/>
-            </a:pPr>
-            <a:r>
-              <a:rPr lang="en-GB" dirty="0"/>
-              <a:t>The variance of the sample mean will be close to the variance of the population divided by the sample size.</a:t>
+              <a:t>T distribution</a:t>
+            </a:r>
+          </a:p>
+          <a:p>
+            <a:r>
+              <a:rPr lang="en-GB" sz="1600" dirty="0"/>
+              <a:t>The T distribution, also known as the Student's t-distribution, is a type of probability distribution that is similar to the normal distribution but with a greater chance for extreme values, hence the fatter tails.</a:t>
             </a:r>
           </a:p>
         </p:txBody>
       </p:sp>
-      <p:sp>
-        <p:nvSpPr>
-          <p:cNvPr id="7" name="TextBox 6">
+      <p:pic>
+        <p:nvPicPr>
+          <p:cNvPr id="1026" name="Picture 2">
             <a:extLst>
               <a:ext uri="{FF2B5EF4-FFF2-40B4-BE49-F238E27FC236}">
-                <a16:creationId xmlns:a16="http://schemas.microsoft.com/office/drawing/2014/main" id="{90CB089E-8DDE-7F25-1192-71BB323C6C6A}"/>
-              </a:ext>
-            </a:extLst>
-          </p:cNvPr>
-          <p:cNvSpPr txBox="1"/>
-          <p:nvPr/>
-        </p:nvSpPr>
-        <p:spPr>
-          <a:xfrm>
-            <a:off x="1215957" y="6080690"/>
-            <a:ext cx="10243226" cy="523220"/>
-          </a:xfrm>
-          <a:prstGeom prst="rect">
-            <a:avLst/>
-          </a:prstGeom>
-          <a:noFill/>
-        </p:spPr>
-        <p:txBody>
-          <a:bodyPr wrap="square" rtlCol="0">
-            <a:spAutoFit/>
-          </a:bodyPr>
-          <a:lstStyle/>
-          <a:p>
-            <a:r>
-              <a:rPr lang="it-IT" sz="1400" dirty="0"/>
-              <a:t>The </a:t>
-            </a:r>
-            <a:r>
-              <a:rPr lang="it-IT" sz="1400" dirty="0" err="1"/>
-              <a:t>primary</a:t>
-            </a:r>
-            <a:r>
-              <a:rPr lang="it-IT" sz="1400" dirty="0"/>
-              <a:t> </a:t>
-            </a:r>
-            <a:r>
-              <a:rPr lang="it-IT" sz="1400" dirty="0" err="1"/>
-              <a:t>value</a:t>
-            </a:r>
-            <a:r>
-              <a:rPr lang="it-IT" sz="1400" dirty="0"/>
-              <a:t> of the CLT </a:t>
-            </a:r>
-            <a:r>
-              <a:rPr lang="it-IT" sz="1400" dirty="0" err="1"/>
-              <a:t>is</a:t>
-            </a:r>
-            <a:r>
-              <a:rPr lang="it-IT" sz="1400" dirty="0"/>
-              <a:t> </a:t>
-            </a:r>
-            <a:r>
-              <a:rPr lang="it-IT" sz="1400" dirty="0" err="1"/>
-              <a:t>that</a:t>
-            </a:r>
-            <a:r>
-              <a:rPr lang="it-IT" sz="1400" dirty="0"/>
-              <a:t> </a:t>
-            </a:r>
-            <a:r>
-              <a:rPr lang="it-IT" sz="1400" dirty="0" err="1"/>
-              <a:t>it</a:t>
-            </a:r>
-            <a:r>
-              <a:rPr lang="it-IT" sz="1400" dirty="0"/>
-              <a:t> </a:t>
-            </a:r>
-            <a:r>
-              <a:rPr lang="it-IT" sz="1400" dirty="0" err="1"/>
-              <a:t>allows</a:t>
-            </a:r>
-            <a:r>
-              <a:rPr lang="it-IT" sz="1400" dirty="0"/>
-              <a:t> </a:t>
-            </a:r>
-            <a:r>
-              <a:rPr lang="it-IT" sz="1400" dirty="0" err="1"/>
-              <a:t>us</a:t>
-            </a:r>
-            <a:r>
-              <a:rPr lang="it-IT" sz="1400" dirty="0"/>
-              <a:t> to compute confidence </a:t>
-            </a:r>
-            <a:r>
-              <a:rPr lang="it-IT" sz="1400" dirty="0" err="1"/>
-              <a:t>levels</a:t>
-            </a:r>
-            <a:r>
-              <a:rPr lang="it-IT" sz="1400" dirty="0"/>
-              <a:t> and </a:t>
-            </a:r>
-            <a:r>
-              <a:rPr lang="it-IT" sz="1400" dirty="0" err="1"/>
-              <a:t>intervals</a:t>
-            </a:r>
-            <a:r>
-              <a:rPr lang="it-IT" sz="1400" dirty="0"/>
-              <a:t> </a:t>
-            </a:r>
-            <a:r>
-              <a:rPr lang="it-IT" sz="1400" dirty="0" err="1"/>
-              <a:t>even</a:t>
-            </a:r>
-            <a:r>
-              <a:rPr lang="it-IT" sz="1400" dirty="0"/>
-              <a:t> </a:t>
-            </a:r>
-            <a:r>
-              <a:rPr lang="it-IT" sz="1400" dirty="0" err="1"/>
-              <a:t>when</a:t>
-            </a:r>
-            <a:r>
-              <a:rPr lang="it-IT" sz="1400" dirty="0"/>
-              <a:t> the </a:t>
-            </a:r>
-            <a:r>
-              <a:rPr lang="it-IT" sz="1400" dirty="0" err="1"/>
-              <a:t>underlying</a:t>
-            </a:r>
-            <a:r>
-              <a:rPr lang="it-IT" sz="1400" dirty="0"/>
-              <a:t> </a:t>
-            </a:r>
-            <a:r>
-              <a:rPr lang="it-IT" sz="1400" dirty="0" err="1"/>
-              <a:t>population</a:t>
-            </a:r>
-            <a:r>
-              <a:rPr lang="it-IT" sz="1400" dirty="0"/>
-              <a:t>  </a:t>
-            </a:r>
-            <a:r>
-              <a:rPr lang="it-IT" sz="1400" dirty="0" err="1"/>
-              <a:t>distribution</a:t>
-            </a:r>
-            <a:r>
-              <a:rPr lang="it-IT" sz="1400" dirty="0"/>
-              <a:t> </a:t>
-            </a:r>
-            <a:r>
-              <a:rPr lang="it-IT" sz="1400" dirty="0" err="1"/>
-              <a:t>is</a:t>
-            </a:r>
-            <a:r>
-              <a:rPr lang="it-IT" sz="1400" dirty="0"/>
-              <a:t> </a:t>
-            </a:r>
-            <a:r>
-              <a:rPr lang="it-IT" sz="1400" dirty="0" err="1"/>
-              <a:t>not</a:t>
-            </a:r>
-            <a:r>
-              <a:rPr lang="it-IT" sz="1400" dirty="0"/>
-              <a:t> </a:t>
-            </a:r>
-            <a:r>
-              <a:rPr lang="it-IT" sz="1400" dirty="0" err="1"/>
-              <a:t>normal</a:t>
-            </a:r>
-            <a:r>
-              <a:rPr lang="it-IT" sz="1400" dirty="0"/>
-              <a:t>.</a:t>
-            </a:r>
-            <a:endParaRPr lang="en-GB" sz="1400" dirty="0"/>
-          </a:p>
-        </p:txBody>
-      </p:sp>
-      <p:grpSp>
-        <p:nvGrpSpPr>
-          <p:cNvPr id="11" name="Group 10">
-            <a:extLst>
-              <a:ext uri="{FF2B5EF4-FFF2-40B4-BE49-F238E27FC236}">
-                <a16:creationId xmlns:a16="http://schemas.microsoft.com/office/drawing/2014/main" id="{7AF58E45-A338-DD6C-31A3-CFFC921079B5}"/>
-              </a:ext>
-            </a:extLst>
-          </p:cNvPr>
-          <p:cNvGrpSpPr/>
-          <p:nvPr/>
-        </p:nvGrpSpPr>
-        <p:grpSpPr>
-          <a:xfrm>
-            <a:off x="503853" y="2831271"/>
-            <a:ext cx="11315253" cy="3141512"/>
-            <a:chOff x="243191" y="2785350"/>
-            <a:chExt cx="11575915" cy="3187433"/>
-          </a:xfrm>
-        </p:grpSpPr>
-        <p:grpSp>
-          <p:nvGrpSpPr>
-            <p:cNvPr id="8" name="Group 7">
-              <a:extLst>
-                <a:ext uri="{FF2B5EF4-FFF2-40B4-BE49-F238E27FC236}">
-                  <a16:creationId xmlns:a16="http://schemas.microsoft.com/office/drawing/2014/main" id="{973DDA88-64B8-E172-6E96-DC124733D4AB}"/>
-                </a:ext>
-              </a:extLst>
-            </p:cNvPr>
-            <p:cNvGrpSpPr/>
-            <p:nvPr/>
-          </p:nvGrpSpPr>
-          <p:grpSpPr>
-            <a:xfrm>
-              <a:off x="301996" y="2834700"/>
-              <a:ext cx="11043052" cy="3023354"/>
-              <a:chOff x="301996" y="2834700"/>
-              <a:chExt cx="11043052" cy="3023354"/>
-            </a:xfrm>
-          </p:grpSpPr>
-          <p:sp>
-            <p:nvSpPr>
-              <p:cNvPr id="2" name="TextBox 1">
-                <a:extLst>
-                  <a:ext uri="{FF2B5EF4-FFF2-40B4-BE49-F238E27FC236}">
-                    <a16:creationId xmlns:a16="http://schemas.microsoft.com/office/drawing/2014/main" id="{E1D8BD6E-9E78-0E01-1DE4-C57CC41B2994}"/>
-                  </a:ext>
-                </a:extLst>
-              </p:cNvPr>
-              <p:cNvSpPr txBox="1"/>
-              <p:nvPr/>
-            </p:nvSpPr>
-            <p:spPr>
-              <a:xfrm>
-                <a:off x="1160120" y="2844572"/>
-                <a:ext cx="2216184" cy="461665"/>
-              </a:xfrm>
-              <a:prstGeom prst="rect">
-                <a:avLst/>
-              </a:prstGeom>
-              <a:noFill/>
-            </p:spPr>
-            <p:txBody>
-              <a:bodyPr wrap="none" rtlCol="0">
-                <a:spAutoFit/>
-              </a:bodyPr>
-              <a:lstStyle/>
-              <a:p>
-                <a:r>
-                  <a:rPr lang="it-IT" sz="1200" dirty="0" err="1"/>
-                  <a:t>Population</a:t>
-                </a:r>
-                <a:r>
-                  <a:rPr lang="it-IT" sz="1200" dirty="0"/>
-                  <a:t> with 10000 </a:t>
-                </a:r>
-                <a:r>
-                  <a:rPr lang="it-IT" sz="1200" dirty="0" err="1"/>
-                  <a:t>elements</a:t>
-                </a:r>
-                <a:endParaRPr lang="it-IT" sz="1200" dirty="0"/>
-              </a:p>
-              <a:p>
-                <a:r>
-                  <a:rPr lang="it-IT" sz="1200" dirty="0"/>
-                  <a:t>following </a:t>
-                </a:r>
-                <a:r>
-                  <a:rPr lang="it-IT" sz="1200" dirty="0" err="1"/>
-                  <a:t>uniform</a:t>
-                </a:r>
-                <a:r>
-                  <a:rPr lang="it-IT" sz="1200" dirty="0"/>
-                  <a:t> </a:t>
-                </a:r>
-                <a:r>
-                  <a:rPr lang="it-IT" sz="1200" dirty="0" err="1"/>
-                  <a:t>distribution</a:t>
-                </a:r>
-                <a:endParaRPr lang="en-GB" sz="1200" dirty="0"/>
-              </a:p>
-            </p:txBody>
-          </p:sp>
-          <p:sp>
-            <p:nvSpPr>
-              <p:cNvPr id="3" name="Arrow: Right 2">
-                <a:extLst>
-                  <a:ext uri="{FF2B5EF4-FFF2-40B4-BE49-F238E27FC236}">
-                    <a16:creationId xmlns:a16="http://schemas.microsoft.com/office/drawing/2014/main" id="{FE233351-61F4-E38E-BF09-EF0B6C8B410A}"/>
-                  </a:ext>
-                </a:extLst>
-              </p:cNvPr>
-              <p:cNvSpPr/>
-              <p:nvPr/>
-            </p:nvSpPr>
-            <p:spPr>
-              <a:xfrm>
-                <a:off x="4305300" y="4414126"/>
-                <a:ext cx="3467100" cy="304800"/>
-              </a:xfrm>
-              <a:prstGeom prst="rightArrow">
-                <a:avLst/>
-              </a:prstGeom>
-            </p:spPr>
-            <p:style>
-              <a:lnRef idx="2">
-                <a:schemeClr val="accent1">
-                  <a:shade val="50000"/>
-                </a:schemeClr>
-              </a:lnRef>
-              <a:fillRef idx="1">
-                <a:schemeClr val="accent1"/>
-              </a:fillRef>
-              <a:effectRef idx="0">
-                <a:schemeClr val="accent1"/>
-              </a:effectRef>
-              <a:fontRef idx="minor">
-                <a:schemeClr val="lt1"/>
-              </a:fontRef>
-            </p:style>
-            <p:txBody>
-              <a:bodyPr rtlCol="0" anchor="ctr"/>
-              <a:lstStyle/>
-              <a:p>
-                <a:pPr algn="ctr"/>
-                <a:endParaRPr lang="en-GB"/>
-              </a:p>
-            </p:txBody>
-          </p:sp>
-          <p:sp>
-            <p:nvSpPr>
-              <p:cNvPr id="6" name="TextBox 5">
-                <a:extLst>
-                  <a:ext uri="{FF2B5EF4-FFF2-40B4-BE49-F238E27FC236}">
-                    <a16:creationId xmlns:a16="http://schemas.microsoft.com/office/drawing/2014/main" id="{337DBF21-BCDE-3E29-7695-CB3B3AEC8A1F}"/>
-                  </a:ext>
-                </a:extLst>
-              </p:cNvPr>
-              <p:cNvSpPr txBox="1"/>
-              <p:nvPr/>
-            </p:nvSpPr>
-            <p:spPr>
-              <a:xfrm>
-                <a:off x="4378973" y="3937876"/>
-                <a:ext cx="3098925" cy="461665"/>
-              </a:xfrm>
-              <a:prstGeom prst="rect">
-                <a:avLst/>
-              </a:prstGeom>
-              <a:noFill/>
-            </p:spPr>
-            <p:txBody>
-              <a:bodyPr wrap="none" rtlCol="0">
-                <a:spAutoFit/>
-              </a:bodyPr>
-              <a:lstStyle/>
-              <a:p>
-                <a:r>
-                  <a:rPr lang="it-IT" sz="1200" dirty="0"/>
-                  <a:t>Take 100 samples with a </a:t>
-                </a:r>
-                <a:r>
-                  <a:rPr lang="it-IT" sz="1200" dirty="0" err="1"/>
-                  <a:t>fixed</a:t>
-                </a:r>
-                <a:r>
-                  <a:rPr lang="it-IT" sz="1200" dirty="0"/>
-                  <a:t> size and </a:t>
-                </a:r>
-                <a:r>
-                  <a:rPr lang="it-IT" sz="1200" dirty="0" err="1"/>
-                  <a:t>calulate</a:t>
-                </a:r>
-                <a:endParaRPr lang="it-IT" sz="1200" dirty="0"/>
-              </a:p>
-              <a:p>
-                <a:r>
-                  <a:rPr lang="it-IT" sz="1200" dirty="0"/>
-                  <a:t> the </a:t>
-                </a:r>
-                <a:r>
-                  <a:rPr lang="it-IT" sz="1200" dirty="0" err="1"/>
-                  <a:t>average</a:t>
-                </a:r>
-                <a:r>
-                  <a:rPr lang="it-IT" sz="1200" dirty="0"/>
-                  <a:t> of </a:t>
-                </a:r>
-                <a:r>
-                  <a:rPr lang="it-IT" sz="1200" dirty="0" err="1"/>
-                  <a:t>each</a:t>
-                </a:r>
-                <a:r>
-                  <a:rPr lang="it-IT" sz="1200" dirty="0"/>
-                  <a:t> sample</a:t>
-                </a:r>
-                <a:endParaRPr lang="en-GB" sz="1200" dirty="0"/>
-              </a:p>
-            </p:txBody>
-          </p:sp>
-          <p:sp>
-            <p:nvSpPr>
-              <p:cNvPr id="9" name="TextBox 8">
-                <a:extLst>
-                  <a:ext uri="{FF2B5EF4-FFF2-40B4-BE49-F238E27FC236}">
-                    <a16:creationId xmlns:a16="http://schemas.microsoft.com/office/drawing/2014/main" id="{E44413D1-9AC7-478F-E697-2C3E3D9D116F}"/>
-                  </a:ext>
-                </a:extLst>
-              </p:cNvPr>
-              <p:cNvSpPr txBox="1"/>
-              <p:nvPr/>
-            </p:nvSpPr>
-            <p:spPr>
-              <a:xfrm>
-                <a:off x="8246123" y="2834700"/>
-                <a:ext cx="3098925" cy="461665"/>
-              </a:xfrm>
-              <a:prstGeom prst="rect">
-                <a:avLst/>
-              </a:prstGeom>
-              <a:noFill/>
-            </p:spPr>
-            <p:txBody>
-              <a:bodyPr wrap="none" rtlCol="0">
-                <a:spAutoFit/>
-              </a:bodyPr>
-              <a:lstStyle/>
-              <a:p>
-                <a:r>
-                  <a:rPr lang="it-IT" sz="1200" dirty="0"/>
-                  <a:t>Take 100 samples with a </a:t>
-                </a:r>
-                <a:r>
-                  <a:rPr lang="it-IT" sz="1200" dirty="0" err="1"/>
-                  <a:t>fixed</a:t>
-                </a:r>
-                <a:r>
-                  <a:rPr lang="it-IT" sz="1200" dirty="0"/>
-                  <a:t> size and </a:t>
-                </a:r>
-                <a:r>
-                  <a:rPr lang="it-IT" sz="1200" dirty="0" err="1"/>
-                  <a:t>calulate</a:t>
-                </a:r>
-                <a:endParaRPr lang="it-IT" sz="1200" dirty="0"/>
-              </a:p>
-              <a:p>
-                <a:r>
-                  <a:rPr lang="it-IT" sz="1200" dirty="0"/>
-                  <a:t> the </a:t>
-                </a:r>
-                <a:r>
-                  <a:rPr lang="it-IT" sz="1200" dirty="0" err="1"/>
-                  <a:t>average</a:t>
-                </a:r>
-                <a:r>
-                  <a:rPr lang="it-IT" sz="1200" dirty="0"/>
-                  <a:t> of </a:t>
-                </a:r>
-                <a:r>
-                  <a:rPr lang="it-IT" sz="1200" dirty="0" err="1"/>
-                  <a:t>each</a:t>
-                </a:r>
-                <a:r>
-                  <a:rPr lang="it-IT" sz="1200" dirty="0"/>
-                  <a:t> sample</a:t>
-                </a:r>
-                <a:endParaRPr lang="en-GB" sz="1200" dirty="0"/>
-              </a:p>
-            </p:txBody>
-          </p:sp>
-          <p:pic>
-            <p:nvPicPr>
-              <p:cNvPr id="14342" name="Picture 6">
-                <a:extLst>
-                  <a:ext uri="{FF2B5EF4-FFF2-40B4-BE49-F238E27FC236}">
-                    <a16:creationId xmlns:a16="http://schemas.microsoft.com/office/drawing/2014/main" id="{19251B3B-60C3-E7A1-2628-23D13CA5DC81}"/>
-                  </a:ext>
-                </a:extLst>
-              </p:cNvPr>
-              <p:cNvPicPr>
-                <a:picLocks noChangeAspect="1" noChangeArrowheads="1"/>
-              </p:cNvPicPr>
-              <p:nvPr/>
-            </p:nvPicPr>
-            <p:blipFill>
-              <a:blip r:embed="rId2">
-                <a:extLst>
-                  <a:ext uri="{28A0092B-C50C-407E-A947-70E740481C1C}">
-                    <a14:useLocalDpi xmlns:a14="http://schemas.microsoft.com/office/drawing/2010/main" val="0"/>
-                  </a:ext>
-                </a:extLst>
-              </a:blip>
-              <a:srcRect/>
-              <a:stretch>
-                <a:fillRect/>
-              </a:stretch>
-            </p:blipFill>
-            <p:spPr bwMode="auto">
-              <a:xfrm>
-                <a:off x="301996" y="3373700"/>
-                <a:ext cx="3816689" cy="2484354"/>
-              </a:xfrm>
-              <a:prstGeom prst="rect">
-                <a:avLst/>
-              </a:prstGeom>
-              <a:noFill/>
-              <a:extLst>
-                <a:ext uri="{909E8E84-426E-40DD-AFC4-6F175D3DCCD1}">
-                  <a14:hiddenFill xmlns:a14="http://schemas.microsoft.com/office/drawing/2010/main">
-                    <a:solidFill>
-                      <a:srgbClr val="FFFFFF"/>
-                    </a:solidFill>
-                  </a14:hiddenFill>
-                </a:ext>
-              </a:extLst>
-            </p:spPr>
-          </p:pic>
-        </p:grpSp>
-        <p:sp>
-          <p:nvSpPr>
-            <p:cNvPr id="10" name="Rectangle 9">
-              <a:extLst>
-                <a:ext uri="{FF2B5EF4-FFF2-40B4-BE49-F238E27FC236}">
-                  <a16:creationId xmlns:a16="http://schemas.microsoft.com/office/drawing/2014/main" id="{B351C8E0-465F-0A1E-F251-F660A94D5A74}"/>
-                </a:ext>
-              </a:extLst>
-            </p:cNvPr>
-            <p:cNvSpPr/>
-            <p:nvPr/>
-          </p:nvSpPr>
-          <p:spPr>
-            <a:xfrm>
-              <a:off x="243191" y="2785350"/>
-              <a:ext cx="11575915" cy="3187433"/>
-            </a:xfrm>
-            <a:prstGeom prst="rect">
-              <a:avLst/>
-            </a:prstGeom>
-            <a:noFill/>
-          </p:spPr>
-          <p:style>
-            <a:lnRef idx="2">
-              <a:schemeClr val="accent1">
-                <a:shade val="50000"/>
-              </a:schemeClr>
-            </a:lnRef>
-            <a:fillRef idx="1">
-              <a:schemeClr val="accent1"/>
-            </a:fillRef>
-            <a:effectRef idx="0">
-              <a:schemeClr val="accent1"/>
-            </a:effectRef>
-            <a:fontRef idx="minor">
-              <a:schemeClr val="lt1"/>
-            </a:fontRef>
-          </p:style>
-          <p:txBody>
-            <a:bodyPr rtlCol="0" anchor="ctr"/>
-            <a:lstStyle/>
-            <a:p>
-              <a:pPr algn="ctr"/>
-              <a:endParaRPr lang="en-GB"/>
-            </a:p>
-          </p:txBody>
-        </p:sp>
-      </p:grpSp>
-      <p:pic>
-        <p:nvPicPr>
-          <p:cNvPr id="14344" name="Picture 8">
-            <a:extLst>
-              <a:ext uri="{FF2B5EF4-FFF2-40B4-BE49-F238E27FC236}">
-                <a16:creationId xmlns:a16="http://schemas.microsoft.com/office/drawing/2014/main" id="{1D8F1E90-0ADE-026E-0493-157731D110E9}"/>
+                <a16:creationId xmlns:a16="http://schemas.microsoft.com/office/drawing/2014/main" id="{8C9BBFDA-0641-26EE-AF92-8274B5BE2DF3}"/>
               </a:ext>
             </a:extLst>
           </p:cNvPr>
@@ -10690,7 +9934,7 @@
           <p:nvPr/>
         </p:nvPicPr>
         <p:blipFill>
-          <a:blip r:embed="rId3">
+          <a:blip r:embed="rId2">
             <a:extLst>
               <a:ext uri="{28A0092B-C50C-407E-A947-70E740481C1C}">
                 <a14:useLocalDpi xmlns:a14="http://schemas.microsoft.com/office/drawing/2010/main" val="0"/>
@@ -10704,8 +9948,8 @@
         </p:blipFill>
         <p:spPr bwMode="auto">
           <a:xfrm>
-            <a:off x="8117949" y="3454326"/>
-            <a:ext cx="3505200" cy="2362200"/>
+            <a:off x="812065" y="2521237"/>
+            <a:ext cx="5606318" cy="3747079"/>
           </a:xfrm>
           <a:prstGeom prst="rect">
             <a:avLst/>
@@ -10722,10 +9966,40 @@
           </a:extLst>
         </p:spPr>
       </p:pic>
+      <p:pic>
+        <p:nvPicPr>
+          <p:cNvPr id="5" name="Picture 4">
+            <a:extLst>
+              <a:ext uri="{FF2B5EF4-FFF2-40B4-BE49-F238E27FC236}">
+                <a16:creationId xmlns:a16="http://schemas.microsoft.com/office/drawing/2014/main" id="{DD018E26-4685-4F7E-9D58-FB0DA7306EAA}"/>
+              </a:ext>
+            </a:extLst>
+          </p:cNvPr>
+          <p:cNvPicPr>
+            <a:picLocks noChangeAspect="1"/>
+          </p:cNvPicPr>
+          <p:nvPr/>
+        </p:nvPicPr>
+        <p:blipFill>
+          <a:blip r:embed="rId3"/>
+          <a:stretch>
+            <a:fillRect/>
+          </a:stretch>
+        </p:blipFill>
+        <p:spPr>
+          <a:xfrm>
+            <a:off x="7587762" y="1257301"/>
+            <a:ext cx="3855560" cy="5484202"/>
+          </a:xfrm>
+          <a:prstGeom prst="rect">
+            <a:avLst/>
+          </a:prstGeom>
+        </p:spPr>
+      </p:pic>
     </p:spTree>
     <p:extLst>
       <p:ext uri="{BB962C8B-B14F-4D97-AF65-F5344CB8AC3E}">
-        <p14:creationId xmlns:p14="http://schemas.microsoft.com/office/powerpoint/2010/main" val="3363913124"/>
+        <p14:creationId xmlns:p14="http://schemas.microsoft.com/office/powerpoint/2010/main" val="2285416668"/>
       </p:ext>
     </p:extLst>
   </p:cSld>
@@ -13080,6 +12354,2109 @@
           <a:chExt cx="0" cy="0"/>
         </a:xfrm>
       </p:grpSpPr>
+      <p:sp>
+        <p:nvSpPr>
+          <p:cNvPr id="4" name="TextBox 3">
+            <a:extLst>
+              <a:ext uri="{FF2B5EF4-FFF2-40B4-BE49-F238E27FC236}">
+                <a16:creationId xmlns:a16="http://schemas.microsoft.com/office/drawing/2014/main" id="{5BC546FC-3FA5-F4A7-9137-68D234C6086A}"/>
+              </a:ext>
+            </a:extLst>
+          </p:cNvPr>
+          <p:cNvSpPr txBox="1"/>
+          <p:nvPr/>
+        </p:nvSpPr>
+        <p:spPr>
+          <a:xfrm>
+            <a:off x="503853" y="531845"/>
+            <a:ext cx="11243388" cy="461665"/>
+          </a:xfrm>
+          <a:prstGeom prst="rect">
+            <a:avLst/>
+          </a:prstGeom>
+          <a:noFill/>
+        </p:spPr>
+        <p:txBody>
+          <a:bodyPr wrap="square" rtlCol="0">
+            <a:spAutoFit/>
+          </a:bodyPr>
+          <a:lstStyle/>
+          <a:p>
+            <a:r>
+              <a:rPr lang="en-GB" sz="2400" b="1" dirty="0"/>
+              <a:t>z-score or t-score?</a:t>
+            </a:r>
+          </a:p>
+        </p:txBody>
+      </p:sp>
+      <p:sp>
+        <p:nvSpPr>
+          <p:cNvPr id="7" name="TextBox 6">
+            <a:extLst>
+              <a:ext uri="{FF2B5EF4-FFF2-40B4-BE49-F238E27FC236}">
+                <a16:creationId xmlns:a16="http://schemas.microsoft.com/office/drawing/2014/main" id="{887EADBB-8312-99F9-0B92-BBDFEE8263B0}"/>
+              </a:ext>
+            </a:extLst>
+          </p:cNvPr>
+          <p:cNvSpPr txBox="1"/>
+          <p:nvPr/>
+        </p:nvSpPr>
+        <p:spPr>
+          <a:xfrm>
+            <a:off x="3692770" y="1714500"/>
+            <a:ext cx="4232890" cy="369332"/>
+          </a:xfrm>
+          <a:prstGeom prst="rect">
+            <a:avLst/>
+          </a:prstGeom>
+          <a:noFill/>
+          <a:ln>
+            <a:solidFill>
+              <a:schemeClr val="tx1"/>
+            </a:solidFill>
+          </a:ln>
+        </p:spPr>
+        <p:txBody>
+          <a:bodyPr wrap="square" rtlCol="0">
+            <a:spAutoFit/>
+          </a:bodyPr>
+          <a:lstStyle/>
+          <a:p>
+            <a:r>
+              <a:rPr lang="en-GB" dirty="0"/>
+              <a:t>Do you know the population standard dev?</a:t>
+            </a:r>
+          </a:p>
+        </p:txBody>
+      </p:sp>
+      <p:sp>
+        <p:nvSpPr>
+          <p:cNvPr id="8" name="TextBox 7">
+            <a:extLst>
+              <a:ext uri="{FF2B5EF4-FFF2-40B4-BE49-F238E27FC236}">
+                <a16:creationId xmlns:a16="http://schemas.microsoft.com/office/drawing/2014/main" id="{A4C58ECF-77FB-4BC7-B579-3CBEE748D93D}"/>
+              </a:ext>
+            </a:extLst>
+          </p:cNvPr>
+          <p:cNvSpPr txBox="1"/>
+          <p:nvPr/>
+        </p:nvSpPr>
+        <p:spPr>
+          <a:xfrm>
+            <a:off x="1793631" y="3042166"/>
+            <a:ext cx="2841996" cy="369332"/>
+          </a:xfrm>
+          <a:prstGeom prst="rect">
+            <a:avLst/>
+          </a:prstGeom>
+          <a:noFill/>
+          <a:ln>
+            <a:solidFill>
+              <a:schemeClr val="tx1"/>
+            </a:solidFill>
+          </a:ln>
+        </p:spPr>
+        <p:txBody>
+          <a:bodyPr wrap="none" rtlCol="0">
+            <a:spAutoFit/>
+          </a:bodyPr>
+          <a:lstStyle/>
+          <a:p>
+            <a:r>
+              <a:rPr lang="en-GB" dirty="0"/>
+              <a:t>Is the sample size above 30?</a:t>
+            </a:r>
+          </a:p>
+        </p:txBody>
+      </p:sp>
+      <p:sp>
+        <p:nvSpPr>
+          <p:cNvPr id="9" name="TextBox 8">
+            <a:extLst>
+              <a:ext uri="{FF2B5EF4-FFF2-40B4-BE49-F238E27FC236}">
+                <a16:creationId xmlns:a16="http://schemas.microsoft.com/office/drawing/2014/main" id="{14D0045A-D94E-0824-5EFD-1ACDB7AC0F8A}"/>
+              </a:ext>
+            </a:extLst>
+          </p:cNvPr>
+          <p:cNvSpPr txBox="1"/>
+          <p:nvPr/>
+        </p:nvSpPr>
+        <p:spPr>
+          <a:xfrm>
+            <a:off x="7925660" y="3042166"/>
+            <a:ext cx="1237711" cy="369332"/>
+          </a:xfrm>
+          <a:prstGeom prst="rect">
+            <a:avLst/>
+          </a:prstGeom>
+          <a:noFill/>
+          <a:ln>
+            <a:solidFill>
+              <a:schemeClr val="tx1"/>
+            </a:solidFill>
+          </a:ln>
+        </p:spPr>
+        <p:txBody>
+          <a:bodyPr wrap="none" rtlCol="0">
+            <a:spAutoFit/>
+          </a:bodyPr>
+          <a:lstStyle/>
+          <a:p>
+            <a:r>
+              <a:rPr lang="en-GB" dirty="0"/>
+              <a:t>Use t-score</a:t>
+            </a:r>
+          </a:p>
+        </p:txBody>
+      </p:sp>
+      <p:sp>
+        <p:nvSpPr>
+          <p:cNvPr id="10" name="TextBox 9">
+            <a:extLst>
+              <a:ext uri="{FF2B5EF4-FFF2-40B4-BE49-F238E27FC236}">
+                <a16:creationId xmlns:a16="http://schemas.microsoft.com/office/drawing/2014/main" id="{A70A0001-0725-0BE2-6B58-B8B499258243}"/>
+              </a:ext>
+            </a:extLst>
+          </p:cNvPr>
+          <p:cNvSpPr txBox="1"/>
+          <p:nvPr/>
+        </p:nvSpPr>
+        <p:spPr>
+          <a:xfrm>
+            <a:off x="1359414" y="4484104"/>
+            <a:ext cx="1252138" cy="369332"/>
+          </a:xfrm>
+          <a:prstGeom prst="rect">
+            <a:avLst/>
+          </a:prstGeom>
+          <a:noFill/>
+          <a:ln>
+            <a:solidFill>
+              <a:schemeClr val="tx1"/>
+            </a:solidFill>
+          </a:ln>
+        </p:spPr>
+        <p:txBody>
+          <a:bodyPr wrap="none" rtlCol="0">
+            <a:spAutoFit/>
+          </a:bodyPr>
+          <a:lstStyle/>
+          <a:p>
+            <a:r>
+              <a:rPr lang="en-GB" dirty="0"/>
+              <a:t>Use z-score</a:t>
+            </a:r>
+          </a:p>
+        </p:txBody>
+      </p:sp>
+      <p:sp>
+        <p:nvSpPr>
+          <p:cNvPr id="11" name="TextBox 10">
+            <a:extLst>
+              <a:ext uri="{FF2B5EF4-FFF2-40B4-BE49-F238E27FC236}">
+                <a16:creationId xmlns:a16="http://schemas.microsoft.com/office/drawing/2014/main" id="{18CBAAB0-BE5D-24A2-E4CA-0B2B9A34B75B}"/>
+              </a:ext>
+            </a:extLst>
+          </p:cNvPr>
+          <p:cNvSpPr txBox="1"/>
+          <p:nvPr/>
+        </p:nvSpPr>
+        <p:spPr>
+          <a:xfrm>
+            <a:off x="3539907" y="4484104"/>
+            <a:ext cx="1237711" cy="369332"/>
+          </a:xfrm>
+          <a:prstGeom prst="rect">
+            <a:avLst/>
+          </a:prstGeom>
+          <a:noFill/>
+          <a:ln>
+            <a:solidFill>
+              <a:schemeClr val="tx1"/>
+            </a:solidFill>
+          </a:ln>
+        </p:spPr>
+        <p:txBody>
+          <a:bodyPr wrap="none" rtlCol="0">
+            <a:spAutoFit/>
+          </a:bodyPr>
+          <a:lstStyle/>
+          <a:p>
+            <a:r>
+              <a:rPr lang="en-GB" dirty="0"/>
+              <a:t>Use t-score</a:t>
+            </a:r>
+          </a:p>
+        </p:txBody>
+      </p:sp>
+      <p:cxnSp>
+        <p:nvCxnSpPr>
+          <p:cNvPr id="14" name="Straight Arrow Connector 13">
+            <a:extLst>
+              <a:ext uri="{FF2B5EF4-FFF2-40B4-BE49-F238E27FC236}">
+                <a16:creationId xmlns:a16="http://schemas.microsoft.com/office/drawing/2014/main" id="{ED3C86DC-8A66-F6E8-89E2-635EC841D919}"/>
+              </a:ext>
+            </a:extLst>
+          </p:cNvPr>
+          <p:cNvCxnSpPr/>
+          <p:nvPr/>
+        </p:nvCxnSpPr>
+        <p:spPr>
+          <a:xfrm flipH="1">
+            <a:off x="3780693" y="2083832"/>
+            <a:ext cx="633046" cy="958334"/>
+          </a:xfrm>
+          <a:prstGeom prst="straightConnector1">
+            <a:avLst/>
+          </a:prstGeom>
+          <a:ln>
+            <a:solidFill>
+              <a:schemeClr val="tx1"/>
+            </a:solidFill>
+            <a:tailEnd type="triangle"/>
+          </a:ln>
+        </p:spPr>
+        <p:style>
+          <a:lnRef idx="1">
+            <a:schemeClr val="accent1"/>
+          </a:lnRef>
+          <a:fillRef idx="0">
+            <a:schemeClr val="accent1"/>
+          </a:fillRef>
+          <a:effectRef idx="0">
+            <a:schemeClr val="accent1"/>
+          </a:effectRef>
+          <a:fontRef idx="minor">
+            <a:schemeClr val="tx1"/>
+          </a:fontRef>
+        </p:style>
+      </p:cxnSp>
+      <p:cxnSp>
+        <p:nvCxnSpPr>
+          <p:cNvPr id="15" name="Straight Arrow Connector 14">
+            <a:extLst>
+              <a:ext uri="{FF2B5EF4-FFF2-40B4-BE49-F238E27FC236}">
+                <a16:creationId xmlns:a16="http://schemas.microsoft.com/office/drawing/2014/main" id="{D1DE622D-E345-8B76-B84E-4DA09D0D7BFB}"/>
+              </a:ext>
+            </a:extLst>
+          </p:cNvPr>
+          <p:cNvCxnSpPr>
+            <a:cxnSpLocks/>
+          </p:cNvCxnSpPr>
+          <p:nvPr/>
+        </p:nvCxnSpPr>
+        <p:spPr>
+          <a:xfrm>
+            <a:off x="7228044" y="2083832"/>
+            <a:ext cx="1025005" cy="958334"/>
+          </a:xfrm>
+          <a:prstGeom prst="straightConnector1">
+            <a:avLst/>
+          </a:prstGeom>
+          <a:ln>
+            <a:solidFill>
+              <a:schemeClr val="tx1"/>
+            </a:solidFill>
+            <a:tailEnd type="triangle"/>
+          </a:ln>
+        </p:spPr>
+        <p:style>
+          <a:lnRef idx="1">
+            <a:schemeClr val="accent1"/>
+          </a:lnRef>
+          <a:fillRef idx="0">
+            <a:schemeClr val="accent1"/>
+          </a:fillRef>
+          <a:effectRef idx="0">
+            <a:schemeClr val="accent1"/>
+          </a:effectRef>
+          <a:fontRef idx="minor">
+            <a:schemeClr val="tx1"/>
+          </a:fontRef>
+        </p:style>
+      </p:cxnSp>
+      <p:cxnSp>
+        <p:nvCxnSpPr>
+          <p:cNvPr id="17" name="Straight Arrow Connector 16">
+            <a:extLst>
+              <a:ext uri="{FF2B5EF4-FFF2-40B4-BE49-F238E27FC236}">
+                <a16:creationId xmlns:a16="http://schemas.microsoft.com/office/drawing/2014/main" id="{C6562C8F-A7B4-9174-BC59-74DB4C16430D}"/>
+              </a:ext>
+            </a:extLst>
+          </p:cNvPr>
+          <p:cNvCxnSpPr>
+            <a:cxnSpLocks/>
+          </p:cNvCxnSpPr>
+          <p:nvPr/>
+        </p:nvCxnSpPr>
+        <p:spPr>
+          <a:xfrm flipH="1">
+            <a:off x="2136531" y="3420318"/>
+            <a:ext cx="633046" cy="1063786"/>
+          </a:xfrm>
+          <a:prstGeom prst="straightConnector1">
+            <a:avLst/>
+          </a:prstGeom>
+          <a:ln>
+            <a:solidFill>
+              <a:schemeClr val="tx1"/>
+            </a:solidFill>
+            <a:tailEnd type="triangle"/>
+          </a:ln>
+        </p:spPr>
+        <p:style>
+          <a:lnRef idx="1">
+            <a:schemeClr val="accent1"/>
+          </a:lnRef>
+          <a:fillRef idx="0">
+            <a:schemeClr val="accent1"/>
+          </a:fillRef>
+          <a:effectRef idx="0">
+            <a:schemeClr val="accent1"/>
+          </a:effectRef>
+          <a:fontRef idx="minor">
+            <a:schemeClr val="tx1"/>
+          </a:fontRef>
+        </p:style>
+      </p:cxnSp>
+      <p:cxnSp>
+        <p:nvCxnSpPr>
+          <p:cNvPr id="19" name="Straight Arrow Connector 18">
+            <a:extLst>
+              <a:ext uri="{FF2B5EF4-FFF2-40B4-BE49-F238E27FC236}">
+                <a16:creationId xmlns:a16="http://schemas.microsoft.com/office/drawing/2014/main" id="{96119A78-91F1-283F-F39A-95BA4C1DBF1C}"/>
+              </a:ext>
+            </a:extLst>
+          </p:cNvPr>
+          <p:cNvCxnSpPr>
+            <a:cxnSpLocks/>
+          </p:cNvCxnSpPr>
+          <p:nvPr/>
+        </p:nvCxnSpPr>
+        <p:spPr>
+          <a:xfrm>
+            <a:off x="3608241" y="3418126"/>
+            <a:ext cx="550522" cy="1065978"/>
+          </a:xfrm>
+          <a:prstGeom prst="straightConnector1">
+            <a:avLst/>
+          </a:prstGeom>
+          <a:ln>
+            <a:solidFill>
+              <a:schemeClr val="tx1"/>
+            </a:solidFill>
+            <a:tailEnd type="triangle"/>
+          </a:ln>
+        </p:spPr>
+        <p:style>
+          <a:lnRef idx="1">
+            <a:schemeClr val="accent1"/>
+          </a:lnRef>
+          <a:fillRef idx="0">
+            <a:schemeClr val="accent1"/>
+          </a:fillRef>
+          <a:effectRef idx="0">
+            <a:schemeClr val="accent1"/>
+          </a:effectRef>
+          <a:fontRef idx="minor">
+            <a:schemeClr val="tx1"/>
+          </a:fontRef>
+        </p:style>
+      </p:cxnSp>
+      <p:sp>
+        <p:nvSpPr>
+          <p:cNvPr id="24" name="TextBox 23">
+            <a:extLst>
+              <a:ext uri="{FF2B5EF4-FFF2-40B4-BE49-F238E27FC236}">
+                <a16:creationId xmlns:a16="http://schemas.microsoft.com/office/drawing/2014/main" id="{5836C3E0-ACE5-6539-E188-E6D42A8328CC}"/>
+              </a:ext>
+            </a:extLst>
+          </p:cNvPr>
+          <p:cNvSpPr txBox="1"/>
+          <p:nvPr/>
+        </p:nvSpPr>
+        <p:spPr>
+          <a:xfrm>
+            <a:off x="8015975" y="5020408"/>
+            <a:ext cx="2294792" cy="646331"/>
+          </a:xfrm>
+          <a:prstGeom prst="rect">
+            <a:avLst/>
+          </a:prstGeom>
+          <a:noFill/>
+          <a:ln>
+            <a:solidFill>
+              <a:srgbClr val="92D050"/>
+            </a:solidFill>
+          </a:ln>
+        </p:spPr>
+        <p:txBody>
+          <a:bodyPr wrap="square" rtlCol="0">
+            <a:spAutoFit/>
+          </a:bodyPr>
+          <a:lstStyle/>
+          <a:p>
+            <a:r>
+              <a:rPr lang="en-GB" dirty="0"/>
+              <a:t>If sample size n &gt; 30 </a:t>
+            </a:r>
+            <a:r>
+              <a:rPr lang="en-GB" dirty="0">
+                <a:sym typeface="Wingdings" panose="05000000000000000000" pitchFamily="2" charset="2"/>
+              </a:rPr>
+              <a:t> </a:t>
+            </a:r>
+            <a:r>
+              <a:rPr lang="en-GB" dirty="0"/>
+              <a:t>t-score ~ z-score</a:t>
+            </a:r>
+          </a:p>
+        </p:txBody>
+      </p:sp>
+      <p:sp>
+        <p:nvSpPr>
+          <p:cNvPr id="25" name="TextBox 24">
+            <a:extLst>
+              <a:ext uri="{FF2B5EF4-FFF2-40B4-BE49-F238E27FC236}">
+                <a16:creationId xmlns:a16="http://schemas.microsoft.com/office/drawing/2014/main" id="{9D4231A4-C66F-F699-E416-CD0EF87E7417}"/>
+              </a:ext>
+            </a:extLst>
+          </p:cNvPr>
+          <p:cNvSpPr txBox="1"/>
+          <p:nvPr/>
+        </p:nvSpPr>
+        <p:spPr>
+          <a:xfrm>
+            <a:off x="3558805" y="2369475"/>
+            <a:ext cx="491225" cy="369332"/>
+          </a:xfrm>
+          <a:prstGeom prst="rect">
+            <a:avLst/>
+          </a:prstGeom>
+          <a:noFill/>
+        </p:spPr>
+        <p:txBody>
+          <a:bodyPr wrap="none" rtlCol="0">
+            <a:spAutoFit/>
+          </a:bodyPr>
+          <a:lstStyle/>
+          <a:p>
+            <a:r>
+              <a:rPr lang="en-GB" dirty="0"/>
+              <a:t>yes</a:t>
+            </a:r>
+          </a:p>
+        </p:txBody>
+      </p:sp>
+      <p:sp>
+        <p:nvSpPr>
+          <p:cNvPr id="26" name="TextBox 25">
+            <a:extLst>
+              <a:ext uri="{FF2B5EF4-FFF2-40B4-BE49-F238E27FC236}">
+                <a16:creationId xmlns:a16="http://schemas.microsoft.com/office/drawing/2014/main" id="{163B746C-D014-C068-7B47-D6A59790BB6F}"/>
+              </a:ext>
+            </a:extLst>
+          </p:cNvPr>
+          <p:cNvSpPr txBox="1"/>
+          <p:nvPr/>
+        </p:nvSpPr>
+        <p:spPr>
+          <a:xfrm>
+            <a:off x="1816615" y="3763135"/>
+            <a:ext cx="491225" cy="369332"/>
+          </a:xfrm>
+          <a:prstGeom prst="rect">
+            <a:avLst/>
+          </a:prstGeom>
+          <a:noFill/>
+        </p:spPr>
+        <p:txBody>
+          <a:bodyPr wrap="none" rtlCol="0">
+            <a:spAutoFit/>
+          </a:bodyPr>
+          <a:lstStyle/>
+          <a:p>
+            <a:r>
+              <a:rPr lang="en-GB" dirty="0"/>
+              <a:t>yes</a:t>
+            </a:r>
+          </a:p>
+        </p:txBody>
+      </p:sp>
+      <p:sp>
+        <p:nvSpPr>
+          <p:cNvPr id="27" name="TextBox 26">
+            <a:extLst>
+              <a:ext uri="{FF2B5EF4-FFF2-40B4-BE49-F238E27FC236}">
+                <a16:creationId xmlns:a16="http://schemas.microsoft.com/office/drawing/2014/main" id="{1C2FE88E-4836-B03E-240F-C4F5C28943AD}"/>
+              </a:ext>
+            </a:extLst>
+          </p:cNvPr>
+          <p:cNvSpPr txBox="1"/>
+          <p:nvPr/>
+        </p:nvSpPr>
+        <p:spPr>
+          <a:xfrm>
+            <a:off x="3947312" y="3631168"/>
+            <a:ext cx="428322" cy="369332"/>
+          </a:xfrm>
+          <a:prstGeom prst="rect">
+            <a:avLst/>
+          </a:prstGeom>
+          <a:noFill/>
+        </p:spPr>
+        <p:txBody>
+          <a:bodyPr wrap="none" rtlCol="0">
+            <a:spAutoFit/>
+          </a:bodyPr>
+          <a:lstStyle/>
+          <a:p>
+            <a:r>
+              <a:rPr lang="en-GB" dirty="0"/>
+              <a:t>no</a:t>
+            </a:r>
+          </a:p>
+        </p:txBody>
+      </p:sp>
+      <p:sp>
+        <p:nvSpPr>
+          <p:cNvPr id="28" name="TextBox 27">
+            <a:extLst>
+              <a:ext uri="{FF2B5EF4-FFF2-40B4-BE49-F238E27FC236}">
+                <a16:creationId xmlns:a16="http://schemas.microsoft.com/office/drawing/2014/main" id="{03FCD6DC-A9DB-4AE3-B37B-806F8572BBE2}"/>
+              </a:ext>
+            </a:extLst>
+          </p:cNvPr>
+          <p:cNvSpPr txBox="1"/>
+          <p:nvPr/>
+        </p:nvSpPr>
+        <p:spPr>
+          <a:xfrm>
+            <a:off x="7770617" y="2268498"/>
+            <a:ext cx="428322" cy="369332"/>
+          </a:xfrm>
+          <a:prstGeom prst="rect">
+            <a:avLst/>
+          </a:prstGeom>
+          <a:noFill/>
+        </p:spPr>
+        <p:txBody>
+          <a:bodyPr wrap="none" rtlCol="0">
+            <a:spAutoFit/>
+          </a:bodyPr>
+          <a:lstStyle/>
+          <a:p>
+            <a:r>
+              <a:rPr lang="en-GB" dirty="0"/>
+              <a:t>no</a:t>
+            </a:r>
+          </a:p>
+        </p:txBody>
+      </p:sp>
+    </p:spTree>
+    <p:extLst>
+      <p:ext uri="{BB962C8B-B14F-4D97-AF65-F5344CB8AC3E}">
+        <p14:creationId xmlns:p14="http://schemas.microsoft.com/office/powerpoint/2010/main" val="379105158"/>
+      </p:ext>
+    </p:extLst>
+  </p:cSld>
+  <p:clrMapOvr>
+    <a:masterClrMapping/>
+  </p:clrMapOvr>
+</p:sld>
+</file>
+
+<file path=ppt/slides/slide21.xml><?xml version="1.0" encoding="utf-8"?>
+<p:sld xmlns:a="http://schemas.openxmlformats.org/drawingml/2006/main" xmlns:r="http://schemas.openxmlformats.org/officeDocument/2006/relationships" xmlns:p="http://schemas.openxmlformats.org/presentationml/2006/main">
+  <p:cSld>
+    <p:spTree>
+      <p:nvGrpSpPr>
+        <p:cNvPr id="1" name=""/>
+        <p:cNvGrpSpPr/>
+        <p:nvPr/>
+      </p:nvGrpSpPr>
+      <p:grpSpPr>
+        <a:xfrm>
+          <a:off x="0" y="0"/>
+          <a:ext cx="0" cy="0"/>
+          <a:chOff x="0" y="0"/>
+          <a:chExt cx="0" cy="0"/>
+        </a:xfrm>
+      </p:grpSpPr>
+      <p:sp>
+        <p:nvSpPr>
+          <p:cNvPr id="5" name="TextBox 4">
+            <a:extLst>
+              <a:ext uri="{FF2B5EF4-FFF2-40B4-BE49-F238E27FC236}">
+                <a16:creationId xmlns:a16="http://schemas.microsoft.com/office/drawing/2014/main" id="{A02E911C-7854-C731-8689-B7F077F504E5}"/>
+              </a:ext>
+            </a:extLst>
+          </p:cNvPr>
+          <p:cNvSpPr txBox="1"/>
+          <p:nvPr/>
+        </p:nvSpPr>
+        <p:spPr>
+          <a:xfrm>
+            <a:off x="503853" y="531845"/>
+            <a:ext cx="11243388" cy="1661993"/>
+          </a:xfrm>
+          <a:prstGeom prst="rect">
+            <a:avLst/>
+          </a:prstGeom>
+          <a:noFill/>
+        </p:spPr>
+        <p:txBody>
+          <a:bodyPr wrap="square" rtlCol="0">
+            <a:spAutoFit/>
+          </a:bodyPr>
+          <a:lstStyle/>
+          <a:p>
+            <a:r>
+              <a:rPr lang="en-GB" sz="2400" b="1" dirty="0"/>
+              <a:t>Confidence interval and confidence level</a:t>
+            </a:r>
+          </a:p>
+          <a:p>
+            <a:endParaRPr lang="en-GB" sz="2400" b="1" dirty="0"/>
+          </a:p>
+          <a:p>
+            <a:r>
+              <a:rPr lang="it-IT" sz="1800" b="1" dirty="0"/>
+              <a:t>Confidence </a:t>
+            </a:r>
+            <a:r>
+              <a:rPr lang="it-IT" sz="1800" b="1" dirty="0" err="1"/>
+              <a:t>interval</a:t>
+            </a:r>
+            <a:r>
+              <a:rPr lang="it-IT" sz="1800" dirty="0"/>
+              <a:t> </a:t>
+            </a:r>
+            <a:r>
+              <a:rPr lang="it-IT" sz="1800" dirty="0" err="1"/>
+              <a:t>provides</a:t>
+            </a:r>
+            <a:r>
+              <a:rPr lang="it-IT" sz="1800" dirty="0"/>
+              <a:t> a range </a:t>
+            </a:r>
+            <a:r>
+              <a:rPr lang="it-IT" sz="1800" dirty="0" err="1"/>
+              <a:t>that</a:t>
+            </a:r>
+            <a:r>
+              <a:rPr lang="it-IT" sz="1800" dirty="0"/>
+              <a:t> </a:t>
+            </a:r>
+            <a:r>
+              <a:rPr lang="it-IT" sz="1800" dirty="0" err="1"/>
+              <a:t>is</a:t>
+            </a:r>
+            <a:r>
+              <a:rPr lang="it-IT" sz="1800" dirty="0"/>
+              <a:t> </a:t>
+            </a:r>
+            <a:r>
+              <a:rPr lang="it-IT" sz="1800" dirty="0" err="1"/>
+              <a:t>likely</a:t>
+            </a:r>
+            <a:r>
+              <a:rPr lang="it-IT" sz="1800" dirty="0"/>
+              <a:t> to </a:t>
+            </a:r>
+            <a:r>
+              <a:rPr lang="it-IT" sz="1800" dirty="0" err="1"/>
+              <a:t>contain</a:t>
+            </a:r>
+            <a:r>
+              <a:rPr lang="it-IT" dirty="0"/>
+              <a:t> </a:t>
+            </a:r>
+            <a:r>
+              <a:rPr lang="it-IT" sz="1800" dirty="0"/>
+              <a:t>the </a:t>
+            </a:r>
+            <a:r>
+              <a:rPr lang="it-IT" sz="1800" dirty="0" err="1"/>
+              <a:t>unknown</a:t>
+            </a:r>
+            <a:r>
+              <a:rPr lang="it-IT" sz="1800" dirty="0"/>
+              <a:t> </a:t>
+            </a:r>
+            <a:r>
+              <a:rPr lang="it-IT" sz="1800" dirty="0" err="1"/>
+              <a:t>value</a:t>
+            </a:r>
+            <a:r>
+              <a:rPr lang="it-IT" sz="1800" dirty="0"/>
+              <a:t> and a degree of confidence (</a:t>
+            </a:r>
+            <a:r>
+              <a:rPr lang="it-IT" sz="1800" b="1" dirty="0"/>
+              <a:t>confidence </a:t>
+            </a:r>
+            <a:r>
+              <a:rPr lang="it-IT" sz="1800" b="1" dirty="0" err="1"/>
+              <a:t>level</a:t>
+            </a:r>
+            <a:r>
+              <a:rPr lang="it-IT" sz="1800" dirty="0"/>
+              <a:t>) </a:t>
+            </a:r>
+            <a:r>
+              <a:rPr lang="it-IT" sz="1800" dirty="0" err="1"/>
+              <a:t>that</a:t>
+            </a:r>
+            <a:r>
+              <a:rPr lang="it-IT" sz="1800" dirty="0"/>
+              <a:t> the </a:t>
+            </a:r>
+            <a:r>
+              <a:rPr lang="it-IT" sz="1800" dirty="0" err="1"/>
+              <a:t>unknown</a:t>
+            </a:r>
+            <a:r>
+              <a:rPr lang="it-IT" sz="1800" dirty="0"/>
+              <a:t> </a:t>
+            </a:r>
+            <a:r>
+              <a:rPr lang="it-IT" sz="1800" dirty="0" err="1"/>
+              <a:t>value</a:t>
+            </a:r>
+            <a:r>
+              <a:rPr lang="it-IT" sz="1800" dirty="0"/>
+              <a:t> </a:t>
+            </a:r>
+            <a:r>
+              <a:rPr lang="it-IT" sz="1800" dirty="0" err="1"/>
+              <a:t>lies</a:t>
+            </a:r>
+            <a:r>
+              <a:rPr lang="it-IT" sz="1800" dirty="0"/>
+              <a:t> </a:t>
+            </a:r>
+            <a:r>
+              <a:rPr lang="it-IT" sz="1800" dirty="0" err="1"/>
+              <a:t>within</a:t>
+            </a:r>
+            <a:r>
+              <a:rPr lang="it-IT" sz="1800" dirty="0"/>
+              <a:t> </a:t>
+            </a:r>
+            <a:r>
+              <a:rPr lang="it-IT" sz="1800" dirty="0" err="1"/>
+              <a:t>that</a:t>
+            </a:r>
+            <a:r>
+              <a:rPr lang="it-IT" sz="1800" dirty="0"/>
+              <a:t> range.</a:t>
+            </a:r>
+            <a:endParaRPr lang="en-GB" sz="1800" dirty="0"/>
+          </a:p>
+          <a:p>
+            <a:endParaRPr lang="en-GB" b="1" dirty="0"/>
+          </a:p>
+        </p:txBody>
+      </p:sp>
+      <p:pic>
+        <p:nvPicPr>
+          <p:cNvPr id="7" name="Picture 2">
+            <a:extLst>
+              <a:ext uri="{FF2B5EF4-FFF2-40B4-BE49-F238E27FC236}">
+                <a16:creationId xmlns:a16="http://schemas.microsoft.com/office/drawing/2014/main" id="{48FF79C7-6055-5E6F-C154-33E5F56A359B}"/>
+              </a:ext>
+            </a:extLst>
+          </p:cNvPr>
+          <p:cNvPicPr>
+            <a:picLocks noChangeAspect="1" noChangeArrowheads="1"/>
+          </p:cNvPicPr>
+          <p:nvPr/>
+        </p:nvPicPr>
+        <p:blipFill>
+          <a:blip r:embed="rId2">
+            <a:extLst>
+              <a:ext uri="{28A0092B-C50C-407E-A947-70E740481C1C}">
+                <a14:useLocalDpi xmlns:a14="http://schemas.microsoft.com/office/drawing/2010/main" val="0"/>
+              </a:ext>
+            </a:extLst>
+          </a:blip>
+          <a:srcRect/>
+          <a:stretch>
+            <a:fillRect/>
+          </a:stretch>
+        </p:blipFill>
+        <p:spPr bwMode="auto">
+          <a:xfrm>
+            <a:off x="567851" y="2524056"/>
+            <a:ext cx="5438775" cy="3638145"/>
+          </a:xfrm>
+          <a:prstGeom prst="rect">
+            <a:avLst/>
+          </a:prstGeom>
+          <a:noFill/>
+          <a:extLst>
+            <a:ext uri="{909E8E84-426E-40DD-AFC4-6F175D3DCCD1}">
+              <a14:hiddenFill xmlns:a14="http://schemas.microsoft.com/office/drawing/2010/main">
+                <a:solidFill>
+                  <a:srgbClr val="FFFFFF"/>
+                </a:solidFill>
+              </a14:hiddenFill>
+            </a:ext>
+          </a:extLst>
+        </p:spPr>
+      </p:pic>
+      <p:grpSp>
+        <p:nvGrpSpPr>
+          <p:cNvPr id="4" name="Group 3">
+            <a:extLst>
+              <a:ext uri="{FF2B5EF4-FFF2-40B4-BE49-F238E27FC236}">
+                <a16:creationId xmlns:a16="http://schemas.microsoft.com/office/drawing/2014/main" id="{3731A7D8-2C30-F514-BD43-027F0D8AD60C}"/>
+              </a:ext>
+            </a:extLst>
+          </p:cNvPr>
+          <p:cNvGrpSpPr/>
+          <p:nvPr/>
+        </p:nvGrpSpPr>
+        <p:grpSpPr>
+          <a:xfrm>
+            <a:off x="7464669" y="2410864"/>
+            <a:ext cx="2728824" cy="1345905"/>
+            <a:chOff x="7464669" y="2410864"/>
+            <a:chExt cx="2728824" cy="1345905"/>
+          </a:xfrm>
+        </p:grpSpPr>
+        <mc:AlternateContent xmlns:mc="http://schemas.openxmlformats.org/markup-compatibility/2006">
+          <mc:Choice xmlns:a14="http://schemas.microsoft.com/office/drawing/2010/main" Requires="a14">
+            <p:sp>
+              <p:nvSpPr>
+                <p:cNvPr id="2" name="TextBox 1">
+                  <a:extLst>
+                    <a:ext uri="{FF2B5EF4-FFF2-40B4-BE49-F238E27FC236}">
+                      <a16:creationId xmlns:a16="http://schemas.microsoft.com/office/drawing/2014/main" id="{1F09F100-F7A1-D91A-5B68-F0F354445F33}"/>
+                    </a:ext>
+                  </a:extLst>
+                </p:cNvPr>
+                <p:cNvSpPr txBox="1"/>
+                <p:nvPr/>
+              </p:nvSpPr>
+              <p:spPr>
+                <a:xfrm>
+                  <a:off x="7572802" y="2824206"/>
+                  <a:ext cx="2427203" cy="932563"/>
+                </a:xfrm>
+                <a:prstGeom prst="rect">
+                  <a:avLst/>
+                </a:prstGeom>
+                <a:noFill/>
+              </p:spPr>
+              <p:txBody>
+                <a:bodyPr wrap="none" lIns="0" tIns="0" rIns="0" bIns="0" rtlCol="0">
+                  <a:spAutoFit/>
+                </a:bodyPr>
+                <a:lstStyle/>
+                <a:p>
+                  <a14:m>
+                    <m:oMathPara xmlns:m="http://schemas.openxmlformats.org/officeDocument/2006/math">
+                      <m:oMathParaPr>
+                        <m:jc m:val="centerGroup"/>
+                      </m:oMathParaPr>
+                      <m:oMath xmlns:m="http://schemas.openxmlformats.org/officeDocument/2006/math">
+                        <m:acc>
+                          <m:accPr>
+                            <m:chr m:val="̅"/>
+                            <m:ctrlPr>
+                              <a:rPr lang="pt-BR" sz="3200" i="1" smtClean="0">
+                                <a:latin typeface="Cambria Math" panose="02040503050406030204" pitchFamily="18" charset="0"/>
+                              </a:rPr>
+                            </m:ctrlPr>
+                          </m:accPr>
+                          <m:e>
+                            <m:r>
+                              <a:rPr lang="en-GB" sz="3200" b="0" i="1" smtClean="0">
+                                <a:latin typeface="Cambria Math" panose="02040503050406030204" pitchFamily="18" charset="0"/>
+                              </a:rPr>
+                              <m:t>𝑥</m:t>
+                            </m:r>
+                          </m:e>
+                        </m:acc>
+                        <m:r>
+                          <a:rPr lang="pt-BR" sz="3200" i="1">
+                            <a:latin typeface="Cambria Math" panose="02040503050406030204" pitchFamily="18" charset="0"/>
+                          </a:rPr>
+                          <m:t>±</m:t>
+                        </m:r>
+                        <m:sSub>
+                          <m:sSubPr>
+                            <m:ctrlPr>
+                              <a:rPr lang="pt-BR" sz="3200" i="1" smtClean="0">
+                                <a:latin typeface="Cambria Math" panose="02040503050406030204" pitchFamily="18" charset="0"/>
+                              </a:rPr>
+                            </m:ctrlPr>
+                          </m:sSubPr>
+                          <m:e>
+                            <m:r>
+                              <a:rPr lang="en-GB" sz="3200" b="0" i="1" smtClean="0">
+                                <a:latin typeface="Cambria Math" panose="02040503050406030204" pitchFamily="18" charset="0"/>
+                              </a:rPr>
+                              <m:t>𝑧</m:t>
+                            </m:r>
+                          </m:e>
+                          <m:sub>
+                            <m:r>
+                              <m:rPr>
+                                <m:sty m:val="p"/>
+                              </m:rPr>
+                              <a:rPr lang="el-GR" sz="3200" i="1" smtClean="0">
+                                <a:latin typeface="Cambria Math" panose="02040503050406030204" pitchFamily="18" charset="0"/>
+                              </a:rPr>
+                              <m:t>α</m:t>
+                            </m:r>
+                            <m:r>
+                              <a:rPr lang="en-GB" sz="3200" b="0" i="1" smtClean="0">
+                                <a:latin typeface="Cambria Math" panose="02040503050406030204" pitchFamily="18" charset="0"/>
+                              </a:rPr>
+                              <m:t>/2</m:t>
+                            </m:r>
+                          </m:sub>
+                        </m:sSub>
+                        <m:r>
+                          <a:rPr lang="en-GB" sz="3200" b="0" i="1" smtClean="0">
+                            <a:latin typeface="Cambria Math" panose="02040503050406030204" pitchFamily="18" charset="0"/>
+                          </a:rPr>
+                          <m:t>∗</m:t>
+                        </m:r>
+                        <m:f>
+                          <m:fPr>
+                            <m:ctrlPr>
+                              <a:rPr lang="en-GB" sz="3200" b="0" i="1" smtClean="0">
+                                <a:latin typeface="Cambria Math" panose="02040503050406030204" pitchFamily="18" charset="0"/>
+                              </a:rPr>
+                            </m:ctrlPr>
+                          </m:fPr>
+                          <m:num>
+                            <m:r>
+                              <m:rPr>
+                                <m:sty m:val="p"/>
+                              </m:rPr>
+                              <a:rPr lang="el-GR" sz="3200" b="0" i="1" smtClean="0">
+                                <a:latin typeface="Cambria Math" panose="02040503050406030204" pitchFamily="18" charset="0"/>
+                              </a:rPr>
+                              <m:t>σ</m:t>
+                            </m:r>
+                          </m:num>
+                          <m:den>
+                            <m:rad>
+                              <m:radPr>
+                                <m:degHide m:val="on"/>
+                                <m:ctrlPr>
+                                  <a:rPr lang="en-GB" sz="3200" b="0" i="1" smtClean="0">
+                                    <a:latin typeface="Cambria Math" panose="02040503050406030204" pitchFamily="18" charset="0"/>
+                                  </a:rPr>
+                                </m:ctrlPr>
+                              </m:radPr>
+                              <m:deg/>
+                              <m:e>
+                                <m:r>
+                                  <a:rPr lang="en-GB" sz="3200" b="0" i="1" smtClean="0">
+                                    <a:latin typeface="Cambria Math" panose="02040503050406030204" pitchFamily="18" charset="0"/>
+                                  </a:rPr>
+                                  <m:t>𝑛</m:t>
+                                </m:r>
+                              </m:e>
+                            </m:rad>
+                          </m:den>
+                        </m:f>
+                      </m:oMath>
+                    </m:oMathPara>
+                  </a14:m>
+                  <a:endParaRPr lang="en-GB" dirty="0"/>
+                </a:p>
+              </p:txBody>
+            </p:sp>
+          </mc:Choice>
+          <mc:Fallback>
+            <p:sp>
+              <p:nvSpPr>
+                <p:cNvPr id="2" name="TextBox 1">
+                  <a:extLst>
+                    <a:ext uri="{FF2B5EF4-FFF2-40B4-BE49-F238E27FC236}">
+                      <a16:creationId xmlns:a16="http://schemas.microsoft.com/office/drawing/2014/main" id="{1F09F100-F7A1-D91A-5B68-F0F354445F33}"/>
+                    </a:ext>
+                  </a:extLst>
+                </p:cNvPr>
+                <p:cNvSpPr txBox="1">
+                  <a:spLocks noRot="1" noChangeAspect="1" noMove="1" noResize="1" noEditPoints="1" noAdjustHandles="1" noChangeArrowheads="1" noChangeShapeType="1" noTextEdit="1"/>
+                </p:cNvSpPr>
+                <p:nvPr/>
+              </p:nvSpPr>
+              <p:spPr>
+                <a:xfrm>
+                  <a:off x="7572802" y="2824206"/>
+                  <a:ext cx="2427203" cy="932563"/>
+                </a:xfrm>
+                <a:prstGeom prst="rect">
+                  <a:avLst/>
+                </a:prstGeom>
+                <a:blipFill>
+                  <a:blip r:embed="rId3"/>
+                  <a:stretch>
+                    <a:fillRect/>
+                  </a:stretch>
+                </a:blipFill>
+              </p:spPr>
+              <p:txBody>
+                <a:bodyPr/>
+                <a:lstStyle/>
+                <a:p>
+                  <a:r>
+                    <a:rPr lang="en-GB">
+                      <a:noFill/>
+                    </a:rPr>
+                    <a:t> </a:t>
+                  </a:r>
+                </a:p>
+              </p:txBody>
+            </p:sp>
+          </mc:Fallback>
+        </mc:AlternateContent>
+        <p:sp>
+          <p:nvSpPr>
+            <p:cNvPr id="3" name="TextBox 2">
+              <a:extLst>
+                <a:ext uri="{FF2B5EF4-FFF2-40B4-BE49-F238E27FC236}">
+                  <a16:creationId xmlns:a16="http://schemas.microsoft.com/office/drawing/2014/main" id="{E6B24E45-2D63-EED0-1431-F72E1E1E6992}"/>
+                </a:ext>
+              </a:extLst>
+            </p:cNvPr>
+            <p:cNvSpPr txBox="1"/>
+            <p:nvPr/>
+          </p:nvSpPr>
+          <p:spPr>
+            <a:xfrm>
+              <a:off x="7464669" y="2410864"/>
+              <a:ext cx="2728824" cy="369332"/>
+            </a:xfrm>
+            <a:prstGeom prst="rect">
+              <a:avLst/>
+            </a:prstGeom>
+            <a:noFill/>
+          </p:spPr>
+          <p:txBody>
+            <a:bodyPr wrap="none" rtlCol="0">
+              <a:spAutoFit/>
+            </a:bodyPr>
+            <a:lstStyle/>
+            <a:p>
+              <a:r>
+                <a:rPr lang="en-GB" dirty="0"/>
+                <a:t>Population variance known</a:t>
+              </a:r>
+            </a:p>
+          </p:txBody>
+        </p:sp>
+      </p:grpSp>
+      <p:grpSp>
+        <p:nvGrpSpPr>
+          <p:cNvPr id="12" name="Group 11">
+            <a:extLst>
+              <a:ext uri="{FF2B5EF4-FFF2-40B4-BE49-F238E27FC236}">
+                <a16:creationId xmlns:a16="http://schemas.microsoft.com/office/drawing/2014/main" id="{216B7A89-9578-57D1-0319-4C681DE83479}"/>
+              </a:ext>
+            </a:extLst>
+          </p:cNvPr>
+          <p:cNvGrpSpPr/>
+          <p:nvPr/>
+        </p:nvGrpSpPr>
+        <p:grpSpPr>
+          <a:xfrm>
+            <a:off x="7464669" y="4343128"/>
+            <a:ext cx="3153582" cy="1304716"/>
+            <a:chOff x="7464669" y="4343128"/>
+            <a:chExt cx="3153582" cy="1304716"/>
+          </a:xfrm>
+        </p:grpSpPr>
+        <mc:AlternateContent xmlns:mc="http://schemas.openxmlformats.org/markup-compatibility/2006">
+          <mc:Choice xmlns:a14="http://schemas.microsoft.com/office/drawing/2010/main" Requires="a14">
+            <p:sp>
+              <p:nvSpPr>
+                <p:cNvPr id="9" name="TextBox 8">
+                  <a:extLst>
+                    <a:ext uri="{FF2B5EF4-FFF2-40B4-BE49-F238E27FC236}">
+                      <a16:creationId xmlns:a16="http://schemas.microsoft.com/office/drawing/2014/main" id="{9E32B187-6C4B-010D-261D-6D34A9B1CC19}"/>
+                    </a:ext>
+                  </a:extLst>
+                </p:cNvPr>
+                <p:cNvSpPr txBox="1"/>
+                <p:nvPr/>
+              </p:nvSpPr>
+              <p:spPr>
+                <a:xfrm>
+                  <a:off x="7572802" y="4712460"/>
+                  <a:ext cx="3045449" cy="935384"/>
+                </a:xfrm>
+                <a:prstGeom prst="rect">
+                  <a:avLst/>
+                </a:prstGeom>
+                <a:noFill/>
+              </p:spPr>
+              <p:txBody>
+                <a:bodyPr wrap="none" lIns="0" tIns="0" rIns="0" bIns="0" rtlCol="0">
+                  <a:spAutoFit/>
+                </a:bodyPr>
+                <a:lstStyle/>
+                <a:p>
+                  <a14:m>
+                    <m:oMathPara xmlns:m="http://schemas.openxmlformats.org/officeDocument/2006/math">
+                      <m:oMathParaPr>
+                        <m:jc m:val="centerGroup"/>
+                      </m:oMathParaPr>
+                      <m:oMath xmlns:m="http://schemas.openxmlformats.org/officeDocument/2006/math">
+                        <m:acc>
+                          <m:accPr>
+                            <m:chr m:val="̅"/>
+                            <m:ctrlPr>
+                              <a:rPr lang="pt-BR" sz="3200" i="1" smtClean="0">
+                                <a:latin typeface="Cambria Math" panose="02040503050406030204" pitchFamily="18" charset="0"/>
+                              </a:rPr>
+                            </m:ctrlPr>
+                          </m:accPr>
+                          <m:e>
+                            <m:r>
+                              <a:rPr lang="en-GB" sz="3200" b="0" i="1" smtClean="0">
+                                <a:latin typeface="Cambria Math" panose="02040503050406030204" pitchFamily="18" charset="0"/>
+                              </a:rPr>
+                              <m:t>𝑥</m:t>
+                            </m:r>
+                          </m:e>
+                        </m:acc>
+                        <m:r>
+                          <a:rPr lang="pt-BR" sz="3200" i="1">
+                            <a:latin typeface="Cambria Math" panose="02040503050406030204" pitchFamily="18" charset="0"/>
+                          </a:rPr>
+                          <m:t>±</m:t>
+                        </m:r>
+                        <m:sSub>
+                          <m:sSubPr>
+                            <m:ctrlPr>
+                              <a:rPr lang="pt-BR" sz="3200" i="1" smtClean="0">
+                                <a:latin typeface="Cambria Math" panose="02040503050406030204" pitchFamily="18" charset="0"/>
+                              </a:rPr>
+                            </m:ctrlPr>
+                          </m:sSubPr>
+                          <m:e>
+                            <m:r>
+                              <a:rPr lang="en-GB" sz="3200" b="0" i="1" smtClean="0">
+                                <a:latin typeface="Cambria Math" panose="02040503050406030204" pitchFamily="18" charset="0"/>
+                              </a:rPr>
+                              <m:t>𝑡</m:t>
+                            </m:r>
+                          </m:e>
+                          <m:sub>
+                            <m:r>
+                              <a:rPr lang="en-GB" sz="3200" b="0" i="1" smtClean="0">
+                                <a:latin typeface="Cambria Math" panose="02040503050406030204" pitchFamily="18" charset="0"/>
+                              </a:rPr>
+                              <m:t>𝑛</m:t>
+                            </m:r>
+                            <m:r>
+                              <a:rPr lang="en-GB" sz="3200" b="0" i="1" smtClean="0">
+                                <a:latin typeface="Cambria Math" panose="02040503050406030204" pitchFamily="18" charset="0"/>
+                              </a:rPr>
+                              <m:t>−1,</m:t>
+                            </m:r>
+                            <m:r>
+                              <m:rPr>
+                                <m:sty m:val="p"/>
+                              </m:rPr>
+                              <a:rPr lang="el-GR" sz="3200" i="1" smtClean="0">
+                                <a:latin typeface="Cambria Math" panose="02040503050406030204" pitchFamily="18" charset="0"/>
+                              </a:rPr>
+                              <m:t>α</m:t>
+                            </m:r>
+                            <m:r>
+                              <a:rPr lang="en-GB" sz="3200" b="0" i="1" smtClean="0">
+                                <a:latin typeface="Cambria Math" panose="02040503050406030204" pitchFamily="18" charset="0"/>
+                              </a:rPr>
+                              <m:t>/2</m:t>
+                            </m:r>
+                          </m:sub>
+                        </m:sSub>
+                        <m:r>
+                          <a:rPr lang="en-GB" sz="3200" b="0" i="1" smtClean="0">
+                            <a:latin typeface="Cambria Math" panose="02040503050406030204" pitchFamily="18" charset="0"/>
+                          </a:rPr>
+                          <m:t>∗</m:t>
+                        </m:r>
+                        <m:f>
+                          <m:fPr>
+                            <m:ctrlPr>
+                              <a:rPr lang="en-GB" sz="3200" b="0" i="1" smtClean="0">
+                                <a:latin typeface="Cambria Math" panose="02040503050406030204" pitchFamily="18" charset="0"/>
+                              </a:rPr>
+                            </m:ctrlPr>
+                          </m:fPr>
+                          <m:num>
+                            <m:r>
+                              <a:rPr lang="en-GB" sz="3200" b="0" i="1" smtClean="0">
+                                <a:latin typeface="Cambria Math" panose="02040503050406030204" pitchFamily="18" charset="0"/>
+                              </a:rPr>
+                              <m:t>𝑠</m:t>
+                            </m:r>
+                          </m:num>
+                          <m:den>
+                            <m:rad>
+                              <m:radPr>
+                                <m:degHide m:val="on"/>
+                                <m:ctrlPr>
+                                  <a:rPr lang="en-GB" sz="3200" b="0" i="1" smtClean="0">
+                                    <a:latin typeface="Cambria Math" panose="02040503050406030204" pitchFamily="18" charset="0"/>
+                                  </a:rPr>
+                                </m:ctrlPr>
+                              </m:radPr>
+                              <m:deg/>
+                              <m:e>
+                                <m:r>
+                                  <a:rPr lang="en-GB" sz="3200" b="0" i="1" smtClean="0">
+                                    <a:latin typeface="Cambria Math" panose="02040503050406030204" pitchFamily="18" charset="0"/>
+                                  </a:rPr>
+                                  <m:t>𝑛</m:t>
+                                </m:r>
+                              </m:e>
+                            </m:rad>
+                          </m:den>
+                        </m:f>
+                      </m:oMath>
+                    </m:oMathPara>
+                  </a14:m>
+                  <a:endParaRPr lang="en-GB" dirty="0"/>
+                </a:p>
+              </p:txBody>
+            </p:sp>
+          </mc:Choice>
+          <mc:Fallback>
+            <p:sp>
+              <p:nvSpPr>
+                <p:cNvPr id="9" name="TextBox 8">
+                  <a:extLst>
+                    <a:ext uri="{FF2B5EF4-FFF2-40B4-BE49-F238E27FC236}">
+                      <a16:creationId xmlns:a16="http://schemas.microsoft.com/office/drawing/2014/main" id="{9E32B187-6C4B-010D-261D-6D34A9B1CC19}"/>
+                    </a:ext>
+                  </a:extLst>
+                </p:cNvPr>
+                <p:cNvSpPr txBox="1">
+                  <a:spLocks noRot="1" noChangeAspect="1" noMove="1" noResize="1" noEditPoints="1" noAdjustHandles="1" noChangeArrowheads="1" noChangeShapeType="1" noTextEdit="1"/>
+                </p:cNvSpPr>
+                <p:nvPr/>
+              </p:nvSpPr>
+              <p:spPr>
+                <a:xfrm>
+                  <a:off x="7572802" y="4712460"/>
+                  <a:ext cx="3045449" cy="935384"/>
+                </a:xfrm>
+                <a:prstGeom prst="rect">
+                  <a:avLst/>
+                </a:prstGeom>
+                <a:blipFill>
+                  <a:blip r:embed="rId4"/>
+                  <a:stretch>
+                    <a:fillRect/>
+                  </a:stretch>
+                </a:blipFill>
+              </p:spPr>
+              <p:txBody>
+                <a:bodyPr/>
+                <a:lstStyle/>
+                <a:p>
+                  <a:r>
+                    <a:rPr lang="en-GB">
+                      <a:noFill/>
+                    </a:rPr>
+                    <a:t> </a:t>
+                  </a:r>
+                </a:p>
+              </p:txBody>
+            </p:sp>
+          </mc:Fallback>
+        </mc:AlternateContent>
+        <p:sp>
+          <p:nvSpPr>
+            <p:cNvPr id="11" name="TextBox 10">
+              <a:extLst>
+                <a:ext uri="{FF2B5EF4-FFF2-40B4-BE49-F238E27FC236}">
+                  <a16:creationId xmlns:a16="http://schemas.microsoft.com/office/drawing/2014/main" id="{FFC1BAD0-C01B-32BF-F8FD-C27CFDB381B9}"/>
+                </a:ext>
+              </a:extLst>
+            </p:cNvPr>
+            <p:cNvSpPr txBox="1"/>
+            <p:nvPr/>
+          </p:nvSpPr>
+          <p:spPr>
+            <a:xfrm>
+              <a:off x="7464669" y="4343128"/>
+              <a:ext cx="2972480" cy="369332"/>
+            </a:xfrm>
+            <a:prstGeom prst="rect">
+              <a:avLst/>
+            </a:prstGeom>
+            <a:noFill/>
+          </p:spPr>
+          <p:txBody>
+            <a:bodyPr wrap="none" rtlCol="0">
+              <a:spAutoFit/>
+            </a:bodyPr>
+            <a:lstStyle/>
+            <a:p>
+              <a:r>
+                <a:rPr lang="en-GB" dirty="0"/>
+                <a:t>Population variance unknown</a:t>
+              </a:r>
+            </a:p>
+          </p:txBody>
+        </p:sp>
+      </p:grpSp>
+    </p:spTree>
+    <p:extLst>
+      <p:ext uri="{BB962C8B-B14F-4D97-AF65-F5344CB8AC3E}">
+        <p14:creationId xmlns:p14="http://schemas.microsoft.com/office/powerpoint/2010/main" val="3672266785"/>
+      </p:ext>
+    </p:extLst>
+  </p:cSld>
+  <p:clrMapOvr>
+    <a:masterClrMapping/>
+  </p:clrMapOvr>
+</p:sld>
+</file>
+
+<file path=ppt/slides/slide22.xml><?xml version="1.0" encoding="utf-8"?>
+<p:sld xmlns:a="http://schemas.openxmlformats.org/drawingml/2006/main" xmlns:r="http://schemas.openxmlformats.org/officeDocument/2006/relationships" xmlns:p="http://schemas.openxmlformats.org/presentationml/2006/main">
+  <p:cSld>
+    <p:spTree>
+      <p:nvGrpSpPr>
+        <p:cNvPr id="1" name=""/>
+        <p:cNvGrpSpPr/>
+        <p:nvPr/>
+      </p:nvGrpSpPr>
+      <p:grpSpPr>
+        <a:xfrm>
+          <a:off x="0" y="0"/>
+          <a:ext cx="0" cy="0"/>
+          <a:chOff x="0" y="0"/>
+          <a:chExt cx="0" cy="0"/>
+        </a:xfrm>
+      </p:grpSpPr>
+      <p:sp>
+        <p:nvSpPr>
+          <p:cNvPr id="4" name="TextBox 3">
+            <a:extLst>
+              <a:ext uri="{FF2B5EF4-FFF2-40B4-BE49-F238E27FC236}">
+                <a16:creationId xmlns:a16="http://schemas.microsoft.com/office/drawing/2014/main" id="{EB45A09E-5C1B-7029-F408-457C3D063C26}"/>
+              </a:ext>
+            </a:extLst>
+          </p:cNvPr>
+          <p:cNvSpPr txBox="1"/>
+          <p:nvPr/>
+        </p:nvSpPr>
+        <p:spPr>
+          <a:xfrm>
+            <a:off x="503853" y="531845"/>
+            <a:ext cx="11243388" cy="1846659"/>
+          </a:xfrm>
+          <a:prstGeom prst="rect">
+            <a:avLst/>
+          </a:prstGeom>
+          <a:noFill/>
+        </p:spPr>
+        <p:txBody>
+          <a:bodyPr wrap="square" rtlCol="0">
+            <a:spAutoFit/>
+          </a:bodyPr>
+          <a:lstStyle/>
+          <a:p>
+            <a:r>
+              <a:rPr lang="en-GB" sz="2400" b="1" dirty="0"/>
+              <a:t>Central limit theorem</a:t>
+            </a:r>
+          </a:p>
+          <a:p>
+            <a:endParaRPr lang="en-GB" b="1" dirty="0"/>
+          </a:p>
+          <a:p>
+            <a:pPr marL="285750" indent="-285750">
+              <a:buFont typeface="Arial" panose="020B0604020202020204" pitchFamily="34" charset="0"/>
+              <a:buChar char="•"/>
+            </a:pPr>
+            <a:r>
+              <a:rPr lang="en-GB" dirty="0"/>
+              <a:t>Given</a:t>
+            </a:r>
+            <a:r>
+              <a:rPr lang="en-GB" b="1" dirty="0"/>
+              <a:t> </a:t>
+            </a:r>
+            <a:r>
+              <a:rPr lang="en-GB" dirty="0"/>
+              <a:t>a set of sufficiently large samples drawn from the same population, the means of the samples will be approximately normally distributed.</a:t>
+            </a:r>
+          </a:p>
+          <a:p>
+            <a:pPr marL="285750" indent="-285750">
+              <a:buFont typeface="Arial" panose="020B0604020202020204" pitchFamily="34" charset="0"/>
+              <a:buChar char="•"/>
+            </a:pPr>
+            <a:r>
+              <a:rPr lang="en-GB" dirty="0"/>
+              <a:t>The normal distribution will have a mean close to the mean of the population.</a:t>
+            </a:r>
+          </a:p>
+          <a:p>
+            <a:pPr marL="285750" indent="-285750">
+              <a:buFont typeface="Arial" panose="020B0604020202020204" pitchFamily="34" charset="0"/>
+              <a:buChar char="•"/>
+            </a:pPr>
+            <a:r>
+              <a:rPr lang="en-GB" dirty="0"/>
+              <a:t>The variance of the sample mean will be close to the variance of the population divided by the sample size.</a:t>
+            </a:r>
+          </a:p>
+        </p:txBody>
+      </p:sp>
+      <p:sp>
+        <p:nvSpPr>
+          <p:cNvPr id="7" name="TextBox 6">
+            <a:extLst>
+              <a:ext uri="{FF2B5EF4-FFF2-40B4-BE49-F238E27FC236}">
+                <a16:creationId xmlns:a16="http://schemas.microsoft.com/office/drawing/2014/main" id="{90CB089E-8DDE-7F25-1192-71BB323C6C6A}"/>
+              </a:ext>
+            </a:extLst>
+          </p:cNvPr>
+          <p:cNvSpPr txBox="1"/>
+          <p:nvPr/>
+        </p:nvSpPr>
+        <p:spPr>
+          <a:xfrm>
+            <a:off x="1215957" y="6080690"/>
+            <a:ext cx="10243226" cy="523220"/>
+          </a:xfrm>
+          <a:prstGeom prst="rect">
+            <a:avLst/>
+          </a:prstGeom>
+          <a:noFill/>
+        </p:spPr>
+        <p:txBody>
+          <a:bodyPr wrap="square" rtlCol="0">
+            <a:spAutoFit/>
+          </a:bodyPr>
+          <a:lstStyle/>
+          <a:p>
+            <a:r>
+              <a:rPr lang="it-IT" sz="1400" dirty="0"/>
+              <a:t>The </a:t>
+            </a:r>
+            <a:r>
+              <a:rPr lang="it-IT" sz="1400" dirty="0" err="1"/>
+              <a:t>primary</a:t>
+            </a:r>
+            <a:r>
+              <a:rPr lang="it-IT" sz="1400" dirty="0"/>
+              <a:t> </a:t>
+            </a:r>
+            <a:r>
+              <a:rPr lang="it-IT" sz="1400" dirty="0" err="1"/>
+              <a:t>value</a:t>
+            </a:r>
+            <a:r>
+              <a:rPr lang="it-IT" sz="1400" dirty="0"/>
+              <a:t> of the CLT </a:t>
+            </a:r>
+            <a:r>
+              <a:rPr lang="it-IT" sz="1400" dirty="0" err="1"/>
+              <a:t>is</a:t>
+            </a:r>
+            <a:r>
+              <a:rPr lang="it-IT" sz="1400" dirty="0"/>
+              <a:t> </a:t>
+            </a:r>
+            <a:r>
+              <a:rPr lang="it-IT" sz="1400" dirty="0" err="1"/>
+              <a:t>that</a:t>
+            </a:r>
+            <a:r>
+              <a:rPr lang="it-IT" sz="1400" dirty="0"/>
+              <a:t> </a:t>
+            </a:r>
+            <a:r>
+              <a:rPr lang="it-IT" sz="1400" dirty="0" err="1"/>
+              <a:t>it</a:t>
+            </a:r>
+            <a:r>
+              <a:rPr lang="it-IT" sz="1400" dirty="0"/>
+              <a:t> </a:t>
+            </a:r>
+            <a:r>
+              <a:rPr lang="it-IT" sz="1400" dirty="0" err="1"/>
+              <a:t>allows</a:t>
+            </a:r>
+            <a:r>
+              <a:rPr lang="it-IT" sz="1400" dirty="0"/>
+              <a:t> </a:t>
+            </a:r>
+            <a:r>
+              <a:rPr lang="it-IT" sz="1400" dirty="0" err="1"/>
+              <a:t>us</a:t>
+            </a:r>
+            <a:r>
+              <a:rPr lang="it-IT" sz="1400" dirty="0"/>
+              <a:t> to compute confidence </a:t>
+            </a:r>
+            <a:r>
+              <a:rPr lang="it-IT" sz="1400" dirty="0" err="1"/>
+              <a:t>levels</a:t>
+            </a:r>
+            <a:r>
+              <a:rPr lang="it-IT" sz="1400" dirty="0"/>
+              <a:t> and </a:t>
+            </a:r>
+            <a:r>
+              <a:rPr lang="it-IT" sz="1400" dirty="0" err="1"/>
+              <a:t>intervals</a:t>
+            </a:r>
+            <a:r>
+              <a:rPr lang="it-IT" sz="1400" dirty="0"/>
+              <a:t> </a:t>
+            </a:r>
+            <a:r>
+              <a:rPr lang="it-IT" sz="1400" dirty="0" err="1"/>
+              <a:t>even</a:t>
+            </a:r>
+            <a:r>
+              <a:rPr lang="it-IT" sz="1400" dirty="0"/>
+              <a:t> </a:t>
+            </a:r>
+            <a:r>
+              <a:rPr lang="it-IT" sz="1400" dirty="0" err="1"/>
+              <a:t>when</a:t>
+            </a:r>
+            <a:r>
+              <a:rPr lang="it-IT" sz="1400" dirty="0"/>
+              <a:t> the </a:t>
+            </a:r>
+            <a:r>
+              <a:rPr lang="it-IT" sz="1400" dirty="0" err="1"/>
+              <a:t>underlying</a:t>
+            </a:r>
+            <a:r>
+              <a:rPr lang="it-IT" sz="1400" dirty="0"/>
+              <a:t> </a:t>
+            </a:r>
+            <a:r>
+              <a:rPr lang="it-IT" sz="1400" dirty="0" err="1"/>
+              <a:t>population</a:t>
+            </a:r>
+            <a:r>
+              <a:rPr lang="it-IT" sz="1400" dirty="0"/>
+              <a:t>  </a:t>
+            </a:r>
+            <a:r>
+              <a:rPr lang="it-IT" sz="1400" dirty="0" err="1"/>
+              <a:t>distribution</a:t>
+            </a:r>
+            <a:r>
+              <a:rPr lang="it-IT" sz="1400" dirty="0"/>
+              <a:t> </a:t>
+            </a:r>
+            <a:r>
+              <a:rPr lang="it-IT" sz="1400" dirty="0" err="1"/>
+              <a:t>is</a:t>
+            </a:r>
+            <a:r>
+              <a:rPr lang="it-IT" sz="1400" dirty="0"/>
+              <a:t> </a:t>
+            </a:r>
+            <a:r>
+              <a:rPr lang="it-IT" sz="1400" dirty="0" err="1"/>
+              <a:t>not</a:t>
+            </a:r>
+            <a:r>
+              <a:rPr lang="it-IT" sz="1400" dirty="0"/>
+              <a:t> </a:t>
+            </a:r>
+            <a:r>
+              <a:rPr lang="it-IT" sz="1400" dirty="0" err="1"/>
+              <a:t>normal</a:t>
+            </a:r>
+            <a:r>
+              <a:rPr lang="it-IT" sz="1400" dirty="0"/>
+              <a:t>.</a:t>
+            </a:r>
+            <a:endParaRPr lang="en-GB" sz="1400" dirty="0"/>
+          </a:p>
+        </p:txBody>
+      </p:sp>
+      <p:grpSp>
+        <p:nvGrpSpPr>
+          <p:cNvPr id="11" name="Group 10">
+            <a:extLst>
+              <a:ext uri="{FF2B5EF4-FFF2-40B4-BE49-F238E27FC236}">
+                <a16:creationId xmlns:a16="http://schemas.microsoft.com/office/drawing/2014/main" id="{7AF58E45-A338-DD6C-31A3-CFFC921079B5}"/>
+              </a:ext>
+            </a:extLst>
+          </p:cNvPr>
+          <p:cNvGrpSpPr/>
+          <p:nvPr/>
+        </p:nvGrpSpPr>
+        <p:grpSpPr>
+          <a:xfrm>
+            <a:off x="503853" y="2831271"/>
+            <a:ext cx="11315253" cy="3141512"/>
+            <a:chOff x="243191" y="2785350"/>
+            <a:chExt cx="11575915" cy="3187433"/>
+          </a:xfrm>
+        </p:grpSpPr>
+        <p:grpSp>
+          <p:nvGrpSpPr>
+            <p:cNvPr id="8" name="Group 7">
+              <a:extLst>
+                <a:ext uri="{FF2B5EF4-FFF2-40B4-BE49-F238E27FC236}">
+                  <a16:creationId xmlns:a16="http://schemas.microsoft.com/office/drawing/2014/main" id="{973DDA88-64B8-E172-6E96-DC124733D4AB}"/>
+                </a:ext>
+              </a:extLst>
+            </p:cNvPr>
+            <p:cNvGrpSpPr/>
+            <p:nvPr/>
+          </p:nvGrpSpPr>
+          <p:grpSpPr>
+            <a:xfrm>
+              <a:off x="301996" y="2834700"/>
+              <a:ext cx="11043052" cy="3023354"/>
+              <a:chOff x="301996" y="2834700"/>
+              <a:chExt cx="11043052" cy="3023354"/>
+            </a:xfrm>
+          </p:grpSpPr>
+          <p:sp>
+            <p:nvSpPr>
+              <p:cNvPr id="2" name="TextBox 1">
+                <a:extLst>
+                  <a:ext uri="{FF2B5EF4-FFF2-40B4-BE49-F238E27FC236}">
+                    <a16:creationId xmlns:a16="http://schemas.microsoft.com/office/drawing/2014/main" id="{E1D8BD6E-9E78-0E01-1DE4-C57CC41B2994}"/>
+                  </a:ext>
+                </a:extLst>
+              </p:cNvPr>
+              <p:cNvSpPr txBox="1"/>
+              <p:nvPr/>
+            </p:nvSpPr>
+            <p:spPr>
+              <a:xfrm>
+                <a:off x="1160120" y="2844572"/>
+                <a:ext cx="2216184" cy="461665"/>
+              </a:xfrm>
+              <a:prstGeom prst="rect">
+                <a:avLst/>
+              </a:prstGeom>
+              <a:noFill/>
+            </p:spPr>
+            <p:txBody>
+              <a:bodyPr wrap="none" rtlCol="0">
+                <a:spAutoFit/>
+              </a:bodyPr>
+              <a:lstStyle/>
+              <a:p>
+                <a:r>
+                  <a:rPr lang="it-IT" sz="1200" dirty="0" err="1"/>
+                  <a:t>Population</a:t>
+                </a:r>
+                <a:r>
+                  <a:rPr lang="it-IT" sz="1200" dirty="0"/>
+                  <a:t> with 10000 </a:t>
+                </a:r>
+                <a:r>
+                  <a:rPr lang="it-IT" sz="1200" dirty="0" err="1"/>
+                  <a:t>elements</a:t>
+                </a:r>
+                <a:endParaRPr lang="it-IT" sz="1200" dirty="0"/>
+              </a:p>
+              <a:p>
+                <a:r>
+                  <a:rPr lang="it-IT" sz="1200" dirty="0"/>
+                  <a:t>following </a:t>
+                </a:r>
+                <a:r>
+                  <a:rPr lang="it-IT" sz="1200" dirty="0" err="1"/>
+                  <a:t>uniform</a:t>
+                </a:r>
+                <a:r>
+                  <a:rPr lang="it-IT" sz="1200" dirty="0"/>
+                  <a:t> </a:t>
+                </a:r>
+                <a:r>
+                  <a:rPr lang="it-IT" sz="1200" dirty="0" err="1"/>
+                  <a:t>distribution</a:t>
+                </a:r>
+                <a:endParaRPr lang="en-GB" sz="1200" dirty="0"/>
+              </a:p>
+            </p:txBody>
+          </p:sp>
+          <p:sp>
+            <p:nvSpPr>
+              <p:cNvPr id="3" name="Arrow: Right 2">
+                <a:extLst>
+                  <a:ext uri="{FF2B5EF4-FFF2-40B4-BE49-F238E27FC236}">
+                    <a16:creationId xmlns:a16="http://schemas.microsoft.com/office/drawing/2014/main" id="{FE233351-61F4-E38E-BF09-EF0B6C8B410A}"/>
+                  </a:ext>
+                </a:extLst>
+              </p:cNvPr>
+              <p:cNvSpPr/>
+              <p:nvPr/>
+            </p:nvSpPr>
+            <p:spPr>
+              <a:xfrm>
+                <a:off x="4305300" y="4414126"/>
+                <a:ext cx="3467100" cy="304800"/>
+              </a:xfrm>
+              <a:prstGeom prst="rightArrow">
+                <a:avLst/>
+              </a:prstGeom>
+            </p:spPr>
+            <p:style>
+              <a:lnRef idx="2">
+                <a:schemeClr val="accent1">
+                  <a:shade val="50000"/>
+                </a:schemeClr>
+              </a:lnRef>
+              <a:fillRef idx="1">
+                <a:schemeClr val="accent1"/>
+              </a:fillRef>
+              <a:effectRef idx="0">
+                <a:schemeClr val="accent1"/>
+              </a:effectRef>
+              <a:fontRef idx="minor">
+                <a:schemeClr val="lt1"/>
+              </a:fontRef>
+            </p:style>
+            <p:txBody>
+              <a:bodyPr rtlCol="0" anchor="ctr"/>
+              <a:lstStyle/>
+              <a:p>
+                <a:pPr algn="ctr"/>
+                <a:endParaRPr lang="en-GB"/>
+              </a:p>
+            </p:txBody>
+          </p:sp>
+          <p:sp>
+            <p:nvSpPr>
+              <p:cNvPr id="6" name="TextBox 5">
+                <a:extLst>
+                  <a:ext uri="{FF2B5EF4-FFF2-40B4-BE49-F238E27FC236}">
+                    <a16:creationId xmlns:a16="http://schemas.microsoft.com/office/drawing/2014/main" id="{337DBF21-BCDE-3E29-7695-CB3B3AEC8A1F}"/>
+                  </a:ext>
+                </a:extLst>
+              </p:cNvPr>
+              <p:cNvSpPr txBox="1"/>
+              <p:nvPr/>
+            </p:nvSpPr>
+            <p:spPr>
+              <a:xfrm>
+                <a:off x="4378973" y="3937876"/>
+                <a:ext cx="3098925" cy="461665"/>
+              </a:xfrm>
+              <a:prstGeom prst="rect">
+                <a:avLst/>
+              </a:prstGeom>
+              <a:noFill/>
+            </p:spPr>
+            <p:txBody>
+              <a:bodyPr wrap="none" rtlCol="0">
+                <a:spAutoFit/>
+              </a:bodyPr>
+              <a:lstStyle/>
+              <a:p>
+                <a:r>
+                  <a:rPr lang="it-IT" sz="1200" dirty="0"/>
+                  <a:t>Take 100 samples with a </a:t>
+                </a:r>
+                <a:r>
+                  <a:rPr lang="it-IT" sz="1200" dirty="0" err="1"/>
+                  <a:t>fixed</a:t>
+                </a:r>
+                <a:r>
+                  <a:rPr lang="it-IT" sz="1200" dirty="0"/>
+                  <a:t> size and </a:t>
+                </a:r>
+                <a:r>
+                  <a:rPr lang="it-IT" sz="1200" dirty="0" err="1"/>
+                  <a:t>calulate</a:t>
+                </a:r>
+                <a:endParaRPr lang="it-IT" sz="1200" dirty="0"/>
+              </a:p>
+              <a:p>
+                <a:r>
+                  <a:rPr lang="it-IT" sz="1200" dirty="0"/>
+                  <a:t> the </a:t>
+                </a:r>
+                <a:r>
+                  <a:rPr lang="it-IT" sz="1200" dirty="0" err="1"/>
+                  <a:t>average</a:t>
+                </a:r>
+                <a:r>
+                  <a:rPr lang="it-IT" sz="1200" dirty="0"/>
+                  <a:t> of </a:t>
+                </a:r>
+                <a:r>
+                  <a:rPr lang="it-IT" sz="1200" dirty="0" err="1"/>
+                  <a:t>each</a:t>
+                </a:r>
+                <a:r>
+                  <a:rPr lang="it-IT" sz="1200" dirty="0"/>
+                  <a:t> sample</a:t>
+                </a:r>
+                <a:endParaRPr lang="en-GB" sz="1200" dirty="0"/>
+              </a:p>
+            </p:txBody>
+          </p:sp>
+          <p:sp>
+            <p:nvSpPr>
+              <p:cNvPr id="9" name="TextBox 8">
+                <a:extLst>
+                  <a:ext uri="{FF2B5EF4-FFF2-40B4-BE49-F238E27FC236}">
+                    <a16:creationId xmlns:a16="http://schemas.microsoft.com/office/drawing/2014/main" id="{E44413D1-9AC7-478F-E697-2C3E3D9D116F}"/>
+                  </a:ext>
+                </a:extLst>
+              </p:cNvPr>
+              <p:cNvSpPr txBox="1"/>
+              <p:nvPr/>
+            </p:nvSpPr>
+            <p:spPr>
+              <a:xfrm>
+                <a:off x="8246123" y="2834700"/>
+                <a:ext cx="3098925" cy="461665"/>
+              </a:xfrm>
+              <a:prstGeom prst="rect">
+                <a:avLst/>
+              </a:prstGeom>
+              <a:noFill/>
+            </p:spPr>
+            <p:txBody>
+              <a:bodyPr wrap="none" rtlCol="0">
+                <a:spAutoFit/>
+              </a:bodyPr>
+              <a:lstStyle/>
+              <a:p>
+                <a:r>
+                  <a:rPr lang="it-IT" sz="1200" dirty="0"/>
+                  <a:t>Take 100 samples with a </a:t>
+                </a:r>
+                <a:r>
+                  <a:rPr lang="it-IT" sz="1200" dirty="0" err="1"/>
+                  <a:t>fixed</a:t>
+                </a:r>
+                <a:r>
+                  <a:rPr lang="it-IT" sz="1200" dirty="0"/>
+                  <a:t> size and </a:t>
+                </a:r>
+                <a:r>
+                  <a:rPr lang="it-IT" sz="1200" dirty="0" err="1"/>
+                  <a:t>calulate</a:t>
+                </a:r>
+                <a:endParaRPr lang="it-IT" sz="1200" dirty="0"/>
+              </a:p>
+              <a:p>
+                <a:r>
+                  <a:rPr lang="it-IT" sz="1200" dirty="0"/>
+                  <a:t> the </a:t>
+                </a:r>
+                <a:r>
+                  <a:rPr lang="it-IT" sz="1200" dirty="0" err="1"/>
+                  <a:t>average</a:t>
+                </a:r>
+                <a:r>
+                  <a:rPr lang="it-IT" sz="1200" dirty="0"/>
+                  <a:t> of </a:t>
+                </a:r>
+                <a:r>
+                  <a:rPr lang="it-IT" sz="1200" dirty="0" err="1"/>
+                  <a:t>each</a:t>
+                </a:r>
+                <a:r>
+                  <a:rPr lang="it-IT" sz="1200" dirty="0"/>
+                  <a:t> sample</a:t>
+                </a:r>
+                <a:endParaRPr lang="en-GB" sz="1200" dirty="0"/>
+              </a:p>
+            </p:txBody>
+          </p:sp>
+          <p:pic>
+            <p:nvPicPr>
+              <p:cNvPr id="14342" name="Picture 6">
+                <a:extLst>
+                  <a:ext uri="{FF2B5EF4-FFF2-40B4-BE49-F238E27FC236}">
+                    <a16:creationId xmlns:a16="http://schemas.microsoft.com/office/drawing/2014/main" id="{19251B3B-60C3-E7A1-2628-23D13CA5DC81}"/>
+                  </a:ext>
+                </a:extLst>
+              </p:cNvPr>
+              <p:cNvPicPr>
+                <a:picLocks noChangeAspect="1" noChangeArrowheads="1"/>
+              </p:cNvPicPr>
+              <p:nvPr/>
+            </p:nvPicPr>
+            <p:blipFill>
+              <a:blip r:embed="rId2">
+                <a:extLst>
+                  <a:ext uri="{28A0092B-C50C-407E-A947-70E740481C1C}">
+                    <a14:useLocalDpi xmlns:a14="http://schemas.microsoft.com/office/drawing/2010/main" val="0"/>
+                  </a:ext>
+                </a:extLst>
+              </a:blip>
+              <a:srcRect/>
+              <a:stretch>
+                <a:fillRect/>
+              </a:stretch>
+            </p:blipFill>
+            <p:spPr bwMode="auto">
+              <a:xfrm>
+                <a:off x="301996" y="3373700"/>
+                <a:ext cx="3816689" cy="2484354"/>
+              </a:xfrm>
+              <a:prstGeom prst="rect">
+                <a:avLst/>
+              </a:prstGeom>
+              <a:noFill/>
+              <a:extLst>
+                <a:ext uri="{909E8E84-426E-40DD-AFC4-6F175D3DCCD1}">
+                  <a14:hiddenFill xmlns:a14="http://schemas.microsoft.com/office/drawing/2010/main">
+                    <a:solidFill>
+                      <a:srgbClr val="FFFFFF"/>
+                    </a:solidFill>
+                  </a14:hiddenFill>
+                </a:ext>
+              </a:extLst>
+            </p:spPr>
+          </p:pic>
+        </p:grpSp>
+        <p:sp>
+          <p:nvSpPr>
+            <p:cNvPr id="10" name="Rectangle 9">
+              <a:extLst>
+                <a:ext uri="{FF2B5EF4-FFF2-40B4-BE49-F238E27FC236}">
+                  <a16:creationId xmlns:a16="http://schemas.microsoft.com/office/drawing/2014/main" id="{B351C8E0-465F-0A1E-F251-F660A94D5A74}"/>
+                </a:ext>
+              </a:extLst>
+            </p:cNvPr>
+            <p:cNvSpPr/>
+            <p:nvPr/>
+          </p:nvSpPr>
+          <p:spPr>
+            <a:xfrm>
+              <a:off x="243191" y="2785350"/>
+              <a:ext cx="11575915" cy="3187433"/>
+            </a:xfrm>
+            <a:prstGeom prst="rect">
+              <a:avLst/>
+            </a:prstGeom>
+            <a:noFill/>
+          </p:spPr>
+          <p:style>
+            <a:lnRef idx="2">
+              <a:schemeClr val="accent1">
+                <a:shade val="50000"/>
+              </a:schemeClr>
+            </a:lnRef>
+            <a:fillRef idx="1">
+              <a:schemeClr val="accent1"/>
+            </a:fillRef>
+            <a:effectRef idx="0">
+              <a:schemeClr val="accent1"/>
+            </a:effectRef>
+            <a:fontRef idx="minor">
+              <a:schemeClr val="lt1"/>
+            </a:fontRef>
+          </p:style>
+          <p:txBody>
+            <a:bodyPr rtlCol="0" anchor="ctr"/>
+            <a:lstStyle/>
+            <a:p>
+              <a:pPr algn="ctr"/>
+              <a:endParaRPr lang="en-GB"/>
+            </a:p>
+          </p:txBody>
+        </p:sp>
+      </p:grpSp>
+      <p:pic>
+        <p:nvPicPr>
+          <p:cNvPr id="14344" name="Picture 8">
+            <a:extLst>
+              <a:ext uri="{FF2B5EF4-FFF2-40B4-BE49-F238E27FC236}">
+                <a16:creationId xmlns:a16="http://schemas.microsoft.com/office/drawing/2014/main" id="{1D8F1E90-0ADE-026E-0493-157731D110E9}"/>
+              </a:ext>
+            </a:extLst>
+          </p:cNvPr>
+          <p:cNvPicPr>
+            <a:picLocks noChangeAspect="1" noChangeArrowheads="1"/>
+          </p:cNvPicPr>
+          <p:nvPr/>
+        </p:nvPicPr>
+        <p:blipFill>
+          <a:blip r:embed="rId3">
+            <a:extLst>
+              <a:ext uri="{28A0092B-C50C-407E-A947-70E740481C1C}">
+                <a14:useLocalDpi xmlns:a14="http://schemas.microsoft.com/office/drawing/2010/main" val="0"/>
+              </a:ext>
+            </a:extLst>
+          </a:blip>
+          <a:srcRect/>
+          <a:stretch>
+            <a:fillRect/>
+          </a:stretch>
+        </p:blipFill>
+        <p:spPr bwMode="auto">
+          <a:xfrm>
+            <a:off x="8117949" y="3454326"/>
+            <a:ext cx="3505200" cy="2362200"/>
+          </a:xfrm>
+          <a:prstGeom prst="rect">
+            <a:avLst/>
+          </a:prstGeom>
+          <a:noFill/>
+          <a:extLst>
+            <a:ext uri="{909E8E84-426E-40DD-AFC4-6F175D3DCCD1}">
+              <a14:hiddenFill xmlns:a14="http://schemas.microsoft.com/office/drawing/2010/main">
+                <a:solidFill>
+                  <a:srgbClr val="FFFFFF"/>
+                </a:solidFill>
+              </a14:hiddenFill>
+            </a:ext>
+          </a:extLst>
+        </p:spPr>
+      </p:pic>
+    </p:spTree>
+    <p:extLst>
+      <p:ext uri="{BB962C8B-B14F-4D97-AF65-F5344CB8AC3E}">
+        <p14:creationId xmlns:p14="http://schemas.microsoft.com/office/powerpoint/2010/main" val="3363913124"/>
+      </p:ext>
+    </p:extLst>
+  </p:cSld>
+  <p:clrMapOvr>
+    <a:masterClrMapping/>
+  </p:clrMapOvr>
+</p:sld>
+</file>
+
+<file path=ppt/slides/slide23.xml><?xml version="1.0" encoding="utf-8"?>
+<p:sld xmlns:a="http://schemas.openxmlformats.org/drawingml/2006/main" xmlns:r="http://schemas.openxmlformats.org/officeDocument/2006/relationships" xmlns:p="http://schemas.openxmlformats.org/presentationml/2006/main">
+  <p:cSld>
+    <p:spTree>
+      <p:nvGrpSpPr>
+        <p:cNvPr id="1" name=""/>
+        <p:cNvGrpSpPr/>
+        <p:nvPr/>
+      </p:nvGrpSpPr>
+      <p:grpSpPr>
+        <a:xfrm>
+          <a:off x="0" y="0"/>
+          <a:ext cx="0" cy="0"/>
+          <a:chOff x="0" y="0"/>
+          <a:chExt cx="0" cy="0"/>
+        </a:xfrm>
+      </p:grpSpPr>
       <mc:AlternateContent xmlns:mc="http://schemas.openxmlformats.org/markup-compatibility/2006" xmlns:a14="http://schemas.microsoft.com/office/drawing/2010/main">
         <mc:Choice Requires="a14">
           <p:sp>
@@ -13287,7 +14664,7 @@
 </p:sld>
 </file>
 
-<file path=ppt/slides/slide21.xml><?xml version="1.0" encoding="utf-8"?>
+<file path=ppt/slides/slide24.xml><?xml version="1.0" encoding="utf-8"?>
 <p:sld xmlns:a="http://schemas.openxmlformats.org/drawingml/2006/main" xmlns:r="http://schemas.openxmlformats.org/officeDocument/2006/relationships" xmlns:p="http://schemas.openxmlformats.org/presentationml/2006/main">
   <p:cSld>
     <p:spTree>
@@ -13708,7 +15085,7 @@
 </p:sld>
 </file>
 
-<file path=ppt/slides/slide22.xml><?xml version="1.0" encoding="utf-8"?>
+<file path=ppt/slides/slide25.xml><?xml version="1.0" encoding="utf-8"?>
 <p:sld xmlns:a="http://schemas.openxmlformats.org/drawingml/2006/main" xmlns:r="http://schemas.openxmlformats.org/officeDocument/2006/relationships" xmlns:p="http://schemas.openxmlformats.org/presentationml/2006/main">
   <p:cSld>
     <p:spTree>
@@ -13803,7 +15180,7 @@
 </p:sld>
 </file>
 
-<file path=ppt/slides/slide23.xml><?xml version="1.0" encoding="utf-8"?>
+<file path=ppt/slides/slide26.xml><?xml version="1.0" encoding="utf-8"?>
 <p:sld xmlns:a="http://schemas.openxmlformats.org/drawingml/2006/main" xmlns:r="http://schemas.openxmlformats.org/officeDocument/2006/relationships" xmlns:p="http://schemas.openxmlformats.org/presentationml/2006/main">
   <p:cSld>
     <p:spTree>
@@ -17973,8 +19350,8 @@
           </a:p>
         </p:txBody>
       </p:sp>
-      <mc:AlternateContent xmlns:mc="http://schemas.openxmlformats.org/markup-compatibility/2006">
-        <mc:Choice xmlns:a14="http://schemas.microsoft.com/office/drawing/2010/main" Requires="a14">
+      <mc:AlternateContent xmlns:mc="http://schemas.openxmlformats.org/markup-compatibility/2006" xmlns:a14="http://schemas.microsoft.com/office/drawing/2010/main">
+        <mc:Choice Requires="a14">
           <p:sp>
             <p:nvSpPr>
               <p:cNvPr id="22" name="TextBox 21">
@@ -18123,7 +19500,7 @@
             </p:txBody>
           </p:sp>
         </mc:Choice>
-        <mc:Fallback>
+        <mc:Fallback xmlns="">
           <p:sp>
             <p:nvSpPr>
               <p:cNvPr id="22" name="TextBox 21">
@@ -18173,8 +19550,8 @@
           </p:sp>
         </mc:Fallback>
       </mc:AlternateContent>
-      <mc:AlternateContent xmlns:mc="http://schemas.openxmlformats.org/markup-compatibility/2006">
-        <mc:Choice xmlns:a14="http://schemas.microsoft.com/office/drawing/2010/main" Requires="a14">
+      <mc:AlternateContent xmlns:mc="http://schemas.openxmlformats.org/markup-compatibility/2006" xmlns:a14="http://schemas.microsoft.com/office/drawing/2010/main">
+        <mc:Choice Requires="a14">
           <p:sp>
             <p:nvSpPr>
               <p:cNvPr id="31" name="TextBox 30">
@@ -18372,7 +19749,7 @@
             </p:txBody>
           </p:sp>
         </mc:Choice>
-        <mc:Fallback>
+        <mc:Fallback xmlns="">
           <p:sp>
             <p:nvSpPr>
               <p:cNvPr id="31" name="TextBox 30">
@@ -18422,8 +19799,8 @@
           </p:sp>
         </mc:Fallback>
       </mc:AlternateContent>
-      <mc:AlternateContent xmlns:mc="http://schemas.openxmlformats.org/markup-compatibility/2006">
-        <mc:Choice xmlns:a14="http://schemas.microsoft.com/office/drawing/2010/main" Requires="a14">
+      <mc:AlternateContent xmlns:mc="http://schemas.openxmlformats.org/markup-compatibility/2006" xmlns:a14="http://schemas.microsoft.com/office/drawing/2010/main">
+        <mc:Choice Requires="a14">
           <p:sp>
             <p:nvSpPr>
               <p:cNvPr id="39" name="TextBox 38">
@@ -18623,7 +20000,7 @@
             </p:txBody>
           </p:sp>
         </mc:Choice>
-        <mc:Fallback>
+        <mc:Fallback xmlns="">
           <p:sp>
             <p:nvSpPr>
               <p:cNvPr id="39" name="TextBox 38">
@@ -18733,8 +20110,8 @@
           <a:chExt cx="0" cy="0"/>
         </a:xfrm>
       </p:grpSpPr>
-      <mc:AlternateContent xmlns:mc="http://schemas.openxmlformats.org/markup-compatibility/2006">
-        <mc:Choice xmlns:a14="http://schemas.microsoft.com/office/drawing/2010/main" Requires="a14">
+      <mc:AlternateContent xmlns:mc="http://schemas.openxmlformats.org/markup-compatibility/2006" xmlns:a14="http://schemas.microsoft.com/office/drawing/2010/main">
+        <mc:Choice Requires="a14">
           <p:graphicFrame>
             <p:nvGraphicFramePr>
               <p:cNvPr id="4" name="Table 4">
@@ -20492,7 +21869,7 @@
             </a:graphic>
           </p:graphicFrame>
         </mc:Choice>
-        <mc:Fallback>
+        <mc:Fallback xmlns="">
           <p:graphicFrame>
             <p:nvGraphicFramePr>
               <p:cNvPr id="4" name="Table 4">

</xml_diff>

<commit_message>
Probability_Statistics: maodificate slides e esercizi
</commit_message>
<xml_diff>
--- a/Probability_Statistics/Probability_Statistics_intro.pptx
+++ b/Probability_Statistics/Probability_Statistics_intro.pptx
@@ -32,6 +32,8 @@
     <p:sldId id="290" r:id="rId26"/>
     <p:sldId id="278" r:id="rId27"/>
     <p:sldId id="295" r:id="rId28"/>
+    <p:sldId id="296" r:id="rId29"/>
+    <p:sldId id="297" r:id="rId30"/>
   </p:sldIdLst>
   <p:sldSz cx="12192000" cy="6858000"/>
   <p:notesSz cx="6858000" cy="9144000"/>
@@ -419,7 +421,7 @@
           <a:p>
             <a:fld id="{C369705D-41FE-4C2A-AD94-64E2E5127CB0}" type="datetimeFigureOut">
               <a:rPr lang="it-IT" smtClean="0"/>
-              <a:t>22/06/2022</a:t>
+              <a:t>16/07/2022</a:t>
             </a:fld>
             <a:endParaRPr lang="it-IT"/>
           </a:p>
@@ -619,7 +621,7 @@
           <a:p>
             <a:fld id="{C369705D-41FE-4C2A-AD94-64E2E5127CB0}" type="datetimeFigureOut">
               <a:rPr lang="it-IT" smtClean="0"/>
-              <a:t>22/06/2022</a:t>
+              <a:t>16/07/2022</a:t>
             </a:fld>
             <a:endParaRPr lang="it-IT"/>
           </a:p>
@@ -829,7 +831,7 @@
           <a:p>
             <a:fld id="{C369705D-41FE-4C2A-AD94-64E2E5127CB0}" type="datetimeFigureOut">
               <a:rPr lang="it-IT" smtClean="0"/>
-              <a:t>22/06/2022</a:t>
+              <a:t>16/07/2022</a:t>
             </a:fld>
             <a:endParaRPr lang="it-IT"/>
           </a:p>
@@ -1029,7 +1031,7 @@
           <a:p>
             <a:fld id="{C369705D-41FE-4C2A-AD94-64E2E5127CB0}" type="datetimeFigureOut">
               <a:rPr lang="it-IT" smtClean="0"/>
-              <a:t>22/06/2022</a:t>
+              <a:t>16/07/2022</a:t>
             </a:fld>
             <a:endParaRPr lang="it-IT"/>
           </a:p>
@@ -1305,7 +1307,7 @@
           <a:p>
             <a:fld id="{C369705D-41FE-4C2A-AD94-64E2E5127CB0}" type="datetimeFigureOut">
               <a:rPr lang="it-IT" smtClean="0"/>
-              <a:t>22/06/2022</a:t>
+              <a:t>16/07/2022</a:t>
             </a:fld>
             <a:endParaRPr lang="it-IT"/>
           </a:p>
@@ -1573,7 +1575,7 @@
           <a:p>
             <a:fld id="{C369705D-41FE-4C2A-AD94-64E2E5127CB0}" type="datetimeFigureOut">
               <a:rPr lang="it-IT" smtClean="0"/>
-              <a:t>22/06/2022</a:t>
+              <a:t>16/07/2022</a:t>
             </a:fld>
             <a:endParaRPr lang="it-IT"/>
           </a:p>
@@ -1988,7 +1990,7 @@
           <a:p>
             <a:fld id="{C369705D-41FE-4C2A-AD94-64E2E5127CB0}" type="datetimeFigureOut">
               <a:rPr lang="it-IT" smtClean="0"/>
-              <a:t>22/06/2022</a:t>
+              <a:t>16/07/2022</a:t>
             </a:fld>
             <a:endParaRPr lang="it-IT"/>
           </a:p>
@@ -2130,7 +2132,7 @@
           <a:p>
             <a:fld id="{C369705D-41FE-4C2A-AD94-64E2E5127CB0}" type="datetimeFigureOut">
               <a:rPr lang="it-IT" smtClean="0"/>
-              <a:t>22/06/2022</a:t>
+              <a:t>16/07/2022</a:t>
             </a:fld>
             <a:endParaRPr lang="it-IT"/>
           </a:p>
@@ -2243,7 +2245,7 @@
           <a:p>
             <a:fld id="{C369705D-41FE-4C2A-AD94-64E2E5127CB0}" type="datetimeFigureOut">
               <a:rPr lang="it-IT" smtClean="0"/>
-              <a:t>22/06/2022</a:t>
+              <a:t>16/07/2022</a:t>
             </a:fld>
             <a:endParaRPr lang="it-IT"/>
           </a:p>
@@ -2556,7 +2558,7 @@
           <a:p>
             <a:fld id="{C369705D-41FE-4C2A-AD94-64E2E5127CB0}" type="datetimeFigureOut">
               <a:rPr lang="it-IT" smtClean="0"/>
-              <a:t>22/06/2022</a:t>
+              <a:t>16/07/2022</a:t>
             </a:fld>
             <a:endParaRPr lang="it-IT"/>
           </a:p>
@@ -2845,7 +2847,7 @@
           <a:p>
             <a:fld id="{C369705D-41FE-4C2A-AD94-64E2E5127CB0}" type="datetimeFigureOut">
               <a:rPr lang="it-IT" smtClean="0"/>
-              <a:t>22/06/2022</a:t>
+              <a:t>16/07/2022</a:t>
             </a:fld>
             <a:endParaRPr lang="it-IT"/>
           </a:p>
@@ -3088,7 +3090,7 @@
           <a:p>
             <a:fld id="{C369705D-41FE-4C2A-AD94-64E2E5127CB0}" type="datetimeFigureOut">
               <a:rPr lang="it-IT" smtClean="0"/>
-              <a:t>22/06/2022</a:t>
+              <a:t>16/07/2022</a:t>
             </a:fld>
             <a:endParaRPr lang="it-IT"/>
           </a:p>
@@ -11211,7 +11213,7 @@
         <p:spPr>
           <a:xfrm>
             <a:off x="503853" y="531845"/>
-            <a:ext cx="11243388" cy="1015663"/>
+            <a:ext cx="11243388" cy="1569660"/>
           </a:xfrm>
           <a:prstGeom prst="rect">
             <a:avLst/>
@@ -11232,8 +11234,11 @@
           <a:p>
             <a:r>
               <a:rPr lang="en-GB" dirty="0"/>
-              <a:t>Normal distribution, also known as the Gaussian distribution, is a probability distribution that is symmetric about the mean, showing that data near the mean are more frequent in occurrence than data far from the mean. </a:t>
-            </a:r>
+              <a:t>In statistics, a normal distribution (also known as Gaussian distribution) is a type of continuous probability distribution for a real-valued random variable. It is symmetric about the mean, showing that data near the mean are more frequent in occurrence than data far from the mean. </a:t>
+            </a:r>
+          </a:p>
+          <a:p>
+            <a:endParaRPr lang="en-GB" dirty="0"/>
           </a:p>
         </p:txBody>
       </p:sp>
@@ -13523,9 +13528,9 @@
         <p:grpSpPr>
           <a:xfrm>
             <a:off x="7464669" y="2410864"/>
-            <a:ext cx="2728824" cy="1345905"/>
+            <a:ext cx="3056824" cy="1345905"/>
             <a:chOff x="7464669" y="2410864"/>
-            <a:chExt cx="2728824" cy="1345905"/>
+            <a:chExt cx="3056824" cy="1345905"/>
           </a:xfrm>
         </p:grpSpPr>
         <mc:AlternateContent xmlns:mc="http://schemas.openxmlformats.org/markup-compatibility/2006">
@@ -13545,7 +13550,7 @@
               <p:spPr>
                 <a:xfrm>
                   <a:off x="7572802" y="2824206"/>
-                  <a:ext cx="2427203" cy="932563"/>
+                  <a:ext cx="2948691" cy="932563"/>
                 </a:xfrm>
                 <a:prstGeom prst="rect">
                   <a:avLst/>
@@ -13565,6 +13570,18 @@
                         <m:jc m:val="centerGroup"/>
                       </m:oMathParaPr>
                       <m:oMath xmlns:m="http://schemas.openxmlformats.org/officeDocument/2006/math">
+                        <m:r>
+                          <a:rPr lang="it-IT" sz="3200" b="0" i="1" smtClean="0">
+                            <a:latin typeface="Cambria Math" panose="02040503050406030204" pitchFamily="18" charset="0"/>
+                          </a:rPr>
+                          <m:t>𝐶𝐼</m:t>
+                        </m:r>
+                        <m:r>
+                          <a:rPr lang="it-IT" sz="3200" b="0" i="1" smtClean="0">
+                            <a:latin typeface="Cambria Math" panose="02040503050406030204" pitchFamily="18" charset="0"/>
+                          </a:rPr>
+                          <m:t>= </m:t>
+                        </m:r>
                         <m:acc>
                           <m:accPr>
                             <m:chr m:val="̅"/>
@@ -13589,40 +13606,12 @@
                           </a:rPr>
                           <m:t>±</m:t>
                         </m:r>
-                        <m:sSub>
-                          <m:sSubPr>
-                            <m:ctrlPr>
-                              <a:rPr lang="pt-BR" sz="3200" i="1" smtClean="0">
-                                <a:latin typeface="Cambria Math" panose="02040503050406030204" pitchFamily="18" charset="0"/>
-                              </a:rPr>
-                            </m:ctrlPr>
-                          </m:sSubPr>
-                          <m:e>
-                            <m:r>
-                              <a:rPr lang="en-GB" sz="3200" b="0" i="1" smtClean="0">
-                                <a:latin typeface="Cambria Math" panose="02040503050406030204" pitchFamily="18" charset="0"/>
-                              </a:rPr>
-                              <m:t>𝑧</m:t>
-                            </m:r>
-                          </m:e>
-                          <m:sub>
-                            <m:r>
-                              <m:rPr>
-                                <m:sty m:val="p"/>
-                              </m:rPr>
-                              <a:rPr lang="el-GR" sz="3200" i="1" smtClean="0">
-                                <a:latin typeface="Cambria Math" panose="02040503050406030204" pitchFamily="18" charset="0"/>
-                              </a:rPr>
-                              <m:t>α</m:t>
-                            </m:r>
-                            <m:r>
-                              <a:rPr lang="en-GB" sz="3200" b="0" i="1" smtClean="0">
-                                <a:latin typeface="Cambria Math" panose="02040503050406030204" pitchFamily="18" charset="0"/>
-                              </a:rPr>
-                              <m:t>/2</m:t>
-                            </m:r>
-                          </m:sub>
-                        </m:sSub>
+                        <m:r>
+                          <a:rPr lang="it-IT" sz="3200" b="0" i="1" smtClean="0">
+                            <a:latin typeface="Cambria Math" panose="02040503050406030204" pitchFamily="18" charset="0"/>
+                          </a:rPr>
+                          <m:t>𝑧</m:t>
+                        </m:r>
                         <m:r>
                           <a:rPr lang="en-GB" sz="3200" b="0" i="1" smtClean="0">
                             <a:latin typeface="Cambria Math" panose="02040503050406030204" pitchFamily="18" charset="0"/>
@@ -13696,7 +13685,7 @@
               <p:spPr>
                 <a:xfrm>
                   <a:off x="7572802" y="2824206"/>
-                  <a:ext cx="2427203" cy="932563"/>
+                  <a:ext cx="2948691" cy="932563"/>
                 </a:xfrm>
                 <a:prstGeom prst="rect">
                   <a:avLst/>
@@ -13774,9 +13763,9 @@
         <p:grpSpPr>
           <a:xfrm>
             <a:off x="7464669" y="4343128"/>
-            <a:ext cx="3153582" cy="1304716"/>
+            <a:ext cx="3614221" cy="1304716"/>
             <a:chOff x="7464669" y="4343128"/>
-            <a:chExt cx="3153582" cy="1304716"/>
+            <a:chExt cx="3614221" cy="1304716"/>
           </a:xfrm>
         </p:grpSpPr>
         <mc:AlternateContent xmlns:mc="http://schemas.openxmlformats.org/markup-compatibility/2006">
@@ -13796,7 +13785,7 @@
               <p:spPr>
                 <a:xfrm>
                   <a:off x="7572802" y="4712460"/>
-                  <a:ext cx="3045449" cy="935384"/>
+                  <a:ext cx="3506088" cy="935384"/>
                 </a:xfrm>
                 <a:prstGeom prst="rect">
                   <a:avLst/>
@@ -13816,6 +13805,18 @@
                         <m:jc m:val="centerGroup"/>
                       </m:oMathParaPr>
                       <m:oMath xmlns:m="http://schemas.openxmlformats.org/officeDocument/2006/math">
+                        <m:r>
+                          <a:rPr lang="it-IT" sz="3200" b="0" i="1" smtClean="0">
+                            <a:latin typeface="Cambria Math" panose="02040503050406030204" pitchFamily="18" charset="0"/>
+                          </a:rPr>
+                          <m:t>𝐶𝐼</m:t>
+                        </m:r>
+                        <m:r>
+                          <a:rPr lang="it-IT" sz="3200" b="0" i="1" smtClean="0">
+                            <a:latin typeface="Cambria Math" panose="02040503050406030204" pitchFamily="18" charset="0"/>
+                          </a:rPr>
+                          <m:t>= </m:t>
+                        </m:r>
                         <m:acc>
                           <m:accPr>
                             <m:chr m:val="̅"/>
@@ -13867,22 +13868,7 @@
                               <a:rPr lang="en-GB" sz="3200" b="0" i="1" smtClean="0">
                                 <a:latin typeface="Cambria Math" panose="02040503050406030204" pitchFamily="18" charset="0"/>
                               </a:rPr>
-                              <m:t>−1,</m:t>
-                            </m:r>
-                            <m:r>
-                              <m:rPr>
-                                <m:sty m:val="p"/>
-                              </m:rPr>
-                              <a:rPr lang="el-GR" sz="3200" i="1" smtClean="0">
-                                <a:latin typeface="Cambria Math" panose="02040503050406030204" pitchFamily="18" charset="0"/>
-                              </a:rPr>
-                              <m:t>α</m:t>
-                            </m:r>
-                            <m:r>
-                              <a:rPr lang="en-GB" sz="3200" b="0" i="1" smtClean="0">
-                                <a:latin typeface="Cambria Math" panose="02040503050406030204" pitchFamily="18" charset="0"/>
-                              </a:rPr>
-                              <m:t>/2</m:t>
+                              <m:t>−1</m:t>
                             </m:r>
                           </m:sub>
                         </m:sSub>
@@ -13956,7 +13942,7 @@
               <p:spPr>
                 <a:xfrm>
                   <a:off x="7572802" y="4712460"/>
-                  <a:ext cx="3045449" cy="935384"/>
+                  <a:ext cx="3506088" cy="935384"/>
                 </a:xfrm>
                 <a:prstGeom prst="rect">
                   <a:avLst/>
@@ -15191,6 +15177,447 @@
     <p:extLst>
       <p:ext uri="{BB962C8B-B14F-4D97-AF65-F5344CB8AC3E}">
         <p14:creationId xmlns:p14="http://schemas.microsoft.com/office/powerpoint/2010/main" val="3815249339"/>
+      </p:ext>
+    </p:extLst>
+  </p:cSld>
+  <p:clrMapOvr>
+    <a:masterClrMapping/>
+  </p:clrMapOvr>
+</p:sld>
+</file>
+
+<file path=ppt/slides/slide28.xml><?xml version="1.0" encoding="utf-8"?>
+<p:sld xmlns:a="http://schemas.openxmlformats.org/drawingml/2006/main" xmlns:r="http://schemas.openxmlformats.org/officeDocument/2006/relationships" xmlns:p="http://schemas.openxmlformats.org/presentationml/2006/main">
+  <p:cSld>
+    <p:spTree>
+      <p:nvGrpSpPr>
+        <p:cNvPr id="1" name=""/>
+        <p:cNvGrpSpPr/>
+        <p:nvPr/>
+      </p:nvGrpSpPr>
+      <p:grpSpPr>
+        <a:xfrm>
+          <a:off x="0" y="0"/>
+          <a:ext cx="0" cy="0"/>
+          <a:chOff x="0" y="0"/>
+          <a:chExt cx="0" cy="0"/>
+        </a:xfrm>
+      </p:grpSpPr>
+      <p:pic>
+        <p:nvPicPr>
+          <p:cNvPr id="14" name="Picture 13">
+            <a:extLst>
+              <a:ext uri="{FF2B5EF4-FFF2-40B4-BE49-F238E27FC236}">
+                <a16:creationId xmlns:a16="http://schemas.microsoft.com/office/drawing/2014/main" id="{49C07CFF-3641-F7FA-19A7-075A450C4608}"/>
+              </a:ext>
+            </a:extLst>
+          </p:cNvPr>
+          <p:cNvPicPr>
+            <a:picLocks noChangeAspect="1"/>
+          </p:cNvPicPr>
+          <p:nvPr/>
+        </p:nvPicPr>
+        <p:blipFill>
+          <a:blip r:embed="rId2"/>
+          <a:stretch>
+            <a:fillRect/>
+          </a:stretch>
+        </p:blipFill>
+        <p:spPr>
+          <a:xfrm>
+            <a:off x="1227754" y="486562"/>
+            <a:ext cx="8897592" cy="2095792"/>
+          </a:xfrm>
+          <a:prstGeom prst="rect">
+            <a:avLst/>
+          </a:prstGeom>
+        </p:spPr>
+      </p:pic>
+      <p:sp>
+        <p:nvSpPr>
+          <p:cNvPr id="16" name="TextBox 15">
+            <a:extLst>
+              <a:ext uri="{FF2B5EF4-FFF2-40B4-BE49-F238E27FC236}">
+                <a16:creationId xmlns:a16="http://schemas.microsoft.com/office/drawing/2014/main" id="{15665F42-A917-05D9-ECC6-6D083F355FC2}"/>
+              </a:ext>
+            </a:extLst>
+          </p:cNvPr>
+          <p:cNvSpPr txBox="1"/>
+          <p:nvPr/>
+        </p:nvSpPr>
+        <p:spPr>
+          <a:xfrm>
+            <a:off x="974603" y="2975756"/>
+            <a:ext cx="9403893" cy="2585323"/>
+          </a:xfrm>
+          <a:prstGeom prst="rect">
+            <a:avLst/>
+          </a:prstGeom>
+          <a:noFill/>
+        </p:spPr>
+        <p:txBody>
+          <a:bodyPr wrap="square">
+            <a:spAutoFit/>
+          </a:bodyPr>
+          <a:lstStyle/>
+          <a:p>
+            <a:pPr algn="l"/>
+            <a:r>
+              <a:rPr lang="en-GB" b="1" i="0" dirty="0">
+                <a:solidFill>
+                  <a:srgbClr val="292929"/>
+                </a:solidFill>
+                <a:effectLst/>
+                <a:latin typeface="charter"/>
+              </a:rPr>
+              <a:t>T-test: </a:t>
+            </a:r>
+            <a:r>
+              <a:rPr lang="en-GB" b="0" i="0" dirty="0">
+                <a:solidFill>
+                  <a:srgbClr val="292929"/>
+                </a:solidFill>
+                <a:effectLst/>
+                <a:latin typeface="charter"/>
+              </a:rPr>
+              <a:t>compare two groups/categories of numeric variables with small sample size</a:t>
+            </a:r>
+          </a:p>
+          <a:p>
+            <a:pPr algn="l"/>
+            <a:endParaRPr lang="en-GB" b="0" i="0" dirty="0">
+              <a:solidFill>
+                <a:srgbClr val="292929"/>
+              </a:solidFill>
+              <a:effectLst/>
+              <a:latin typeface="charter"/>
+            </a:endParaRPr>
+          </a:p>
+          <a:p>
+            <a:pPr algn="l"/>
+            <a:r>
+              <a:rPr lang="en-GB" b="1" i="0" dirty="0">
+                <a:solidFill>
+                  <a:srgbClr val="292929"/>
+                </a:solidFill>
+                <a:effectLst/>
+                <a:latin typeface="charter"/>
+              </a:rPr>
+              <a:t>Z-test:</a:t>
+            </a:r>
+            <a:r>
+              <a:rPr lang="en-GB" b="0" i="0" dirty="0">
+                <a:solidFill>
+                  <a:srgbClr val="292929"/>
+                </a:solidFill>
+                <a:effectLst/>
+                <a:latin typeface="charter"/>
+              </a:rPr>
+              <a:t> compare two groups/categories of numeric variables with large sample size</a:t>
+            </a:r>
+          </a:p>
+          <a:p>
+            <a:pPr algn="l"/>
+            <a:endParaRPr lang="en-GB" b="0" i="0" dirty="0">
+              <a:solidFill>
+                <a:srgbClr val="292929"/>
+              </a:solidFill>
+              <a:effectLst/>
+              <a:latin typeface="charter"/>
+            </a:endParaRPr>
+          </a:p>
+          <a:p>
+            <a:pPr algn="l"/>
+            <a:r>
+              <a:rPr lang="en-GB" b="1" i="0" dirty="0">
+                <a:solidFill>
+                  <a:srgbClr val="292929"/>
+                </a:solidFill>
+                <a:effectLst/>
+                <a:latin typeface="charter"/>
+              </a:rPr>
+              <a:t>ANOVA test:</a:t>
+            </a:r>
+            <a:r>
+              <a:rPr lang="en-GB" b="0" i="0" dirty="0">
+                <a:solidFill>
+                  <a:srgbClr val="292929"/>
+                </a:solidFill>
+                <a:effectLst/>
+                <a:latin typeface="charter"/>
+              </a:rPr>
+              <a:t> compare the difference between two or more groups/categories of numeric variables</a:t>
+            </a:r>
+          </a:p>
+          <a:p>
+            <a:pPr algn="l"/>
+            <a:endParaRPr lang="en-GB" b="0" i="0" dirty="0">
+              <a:solidFill>
+                <a:srgbClr val="292929"/>
+              </a:solidFill>
+              <a:effectLst/>
+              <a:latin typeface="charter"/>
+            </a:endParaRPr>
+          </a:p>
+          <a:p>
+            <a:pPr algn="l"/>
+            <a:r>
+              <a:rPr lang="en-GB" b="1" i="0" dirty="0">
+                <a:solidFill>
+                  <a:srgbClr val="292929"/>
+                </a:solidFill>
+                <a:effectLst/>
+                <a:latin typeface="charter"/>
+              </a:rPr>
+              <a:t>Chi-Squared test:</a:t>
+            </a:r>
+            <a:r>
+              <a:rPr lang="en-GB" b="0" i="0" dirty="0">
+                <a:solidFill>
+                  <a:srgbClr val="292929"/>
+                </a:solidFill>
+                <a:effectLst/>
+                <a:latin typeface="charter"/>
+              </a:rPr>
+              <a:t> examine the relationship between two categorical variables</a:t>
+            </a:r>
+          </a:p>
+          <a:p>
+            <a:pPr algn="l"/>
+            <a:endParaRPr lang="en-GB" b="0" i="0" dirty="0">
+              <a:solidFill>
+                <a:srgbClr val="292929"/>
+              </a:solidFill>
+              <a:effectLst/>
+              <a:latin typeface="charter"/>
+            </a:endParaRPr>
+          </a:p>
+          <a:p>
+            <a:pPr algn="l"/>
+            <a:r>
+              <a:rPr lang="en-GB" b="1" i="0" dirty="0">
+                <a:solidFill>
+                  <a:srgbClr val="292929"/>
+                </a:solidFill>
+                <a:effectLst/>
+                <a:latin typeface="charter"/>
+              </a:rPr>
+              <a:t>Correlation test:</a:t>
+            </a:r>
+            <a:r>
+              <a:rPr lang="en-GB" b="0" i="0" dirty="0">
+                <a:solidFill>
+                  <a:srgbClr val="292929"/>
+                </a:solidFill>
+                <a:effectLst/>
+                <a:latin typeface="charter"/>
+              </a:rPr>
+              <a:t> examine the relationship between two numeric variables</a:t>
+            </a:r>
+          </a:p>
+        </p:txBody>
+      </p:sp>
+      <p:sp>
+        <p:nvSpPr>
+          <p:cNvPr id="18" name="TextBox 17">
+            <a:extLst>
+              <a:ext uri="{FF2B5EF4-FFF2-40B4-BE49-F238E27FC236}">
+                <a16:creationId xmlns:a16="http://schemas.microsoft.com/office/drawing/2014/main" id="{2793DD62-29C4-9430-136C-E31A8FA993E9}"/>
+              </a:ext>
+            </a:extLst>
+          </p:cNvPr>
+          <p:cNvSpPr txBox="1"/>
+          <p:nvPr/>
+        </p:nvSpPr>
+        <p:spPr>
+          <a:xfrm>
+            <a:off x="2416029" y="6508480"/>
+            <a:ext cx="7029975" cy="261610"/>
+          </a:xfrm>
+          <a:prstGeom prst="rect">
+            <a:avLst/>
+          </a:prstGeom>
+          <a:noFill/>
+        </p:spPr>
+        <p:txBody>
+          <a:bodyPr wrap="square">
+            <a:spAutoFit/>
+          </a:bodyPr>
+          <a:lstStyle/>
+          <a:p>
+            <a:r>
+              <a:rPr lang="en-GB" sz="1100" dirty="0"/>
+              <a:t>Source: https://medium.com/towards-data-science/an-interactive-guide-to-hypothesis-testing-in-python-979f4d62d85</a:t>
+            </a:r>
+          </a:p>
+        </p:txBody>
+      </p:sp>
+    </p:spTree>
+    <p:extLst>
+      <p:ext uri="{BB962C8B-B14F-4D97-AF65-F5344CB8AC3E}">
+        <p14:creationId xmlns:p14="http://schemas.microsoft.com/office/powerpoint/2010/main" val="904932713"/>
+      </p:ext>
+    </p:extLst>
+  </p:cSld>
+  <p:clrMapOvr>
+    <a:masterClrMapping/>
+  </p:clrMapOvr>
+</p:sld>
+</file>
+
+<file path=ppt/slides/slide29.xml><?xml version="1.0" encoding="utf-8"?>
+<p:sld xmlns:a="http://schemas.openxmlformats.org/drawingml/2006/main" xmlns:r="http://schemas.openxmlformats.org/officeDocument/2006/relationships" xmlns:p="http://schemas.openxmlformats.org/presentationml/2006/main">
+  <p:cSld>
+    <p:spTree>
+      <p:nvGrpSpPr>
+        <p:cNvPr id="1" name=""/>
+        <p:cNvGrpSpPr/>
+        <p:nvPr/>
+      </p:nvGrpSpPr>
+      <p:grpSpPr>
+        <a:xfrm>
+          <a:off x="0" y="0"/>
+          <a:ext cx="0" cy="0"/>
+          <a:chOff x="0" y="0"/>
+          <a:chExt cx="0" cy="0"/>
+        </a:xfrm>
+      </p:grpSpPr>
+      <p:sp>
+        <p:nvSpPr>
+          <p:cNvPr id="9" name="TextBox 8">
+            <a:extLst>
+              <a:ext uri="{FF2B5EF4-FFF2-40B4-BE49-F238E27FC236}">
+                <a16:creationId xmlns:a16="http://schemas.microsoft.com/office/drawing/2014/main" id="{CC946E21-B2F2-8E17-5525-D563D247E94C}"/>
+              </a:ext>
+            </a:extLst>
+          </p:cNvPr>
+          <p:cNvSpPr txBox="1"/>
+          <p:nvPr/>
+        </p:nvSpPr>
+        <p:spPr>
+          <a:xfrm>
+            <a:off x="503852" y="1702046"/>
+            <a:ext cx="10217277" cy="2862322"/>
+          </a:xfrm>
+          <a:prstGeom prst="rect">
+            <a:avLst/>
+          </a:prstGeom>
+          <a:noFill/>
+        </p:spPr>
+        <p:txBody>
+          <a:bodyPr wrap="square">
+            <a:spAutoFit/>
+          </a:bodyPr>
+          <a:lstStyle/>
+          <a:p>
+            <a:r>
+              <a:rPr lang="en-GB" dirty="0"/>
+              <a:t>Implication of hypothesis testing:</a:t>
+            </a:r>
+          </a:p>
+          <a:p>
+            <a:endParaRPr lang="en-GB" dirty="0"/>
+          </a:p>
+          <a:p>
+            <a:pPr marL="285750" indent="-285750">
+              <a:buFont typeface="Arial" panose="020B0604020202020204" pitchFamily="34" charset="0"/>
+              <a:buChar char="•"/>
+            </a:pPr>
+            <a:r>
+              <a:rPr lang="en-GB" b="1" dirty="0"/>
+              <a:t>clinical research</a:t>
+            </a:r>
+            <a:r>
+              <a:rPr lang="en-GB" dirty="0"/>
+              <a:t>: widely used in psychology, biology and healthcare research to examine the effectiveness of clinical trials</a:t>
+            </a:r>
+          </a:p>
+          <a:p>
+            <a:pPr marL="285750" indent="-285750">
+              <a:buFont typeface="Arial" panose="020B0604020202020204" pitchFamily="34" charset="0"/>
+              <a:buChar char="•"/>
+            </a:pPr>
+            <a:endParaRPr lang="en-GB" dirty="0"/>
+          </a:p>
+          <a:p>
+            <a:pPr marL="285750" indent="-285750">
+              <a:buFont typeface="Arial" panose="020B0604020202020204" pitchFamily="34" charset="0"/>
+              <a:buChar char="•"/>
+            </a:pPr>
+            <a:r>
+              <a:rPr lang="en-GB" b="1" dirty="0"/>
+              <a:t>A/B testing</a:t>
+            </a:r>
+            <a:r>
+              <a:rPr lang="en-GB" dirty="0"/>
+              <a:t>: can be applied in business context to improve conversions through testing different versions of campaign incentives, website designs, etc.</a:t>
+            </a:r>
+          </a:p>
+          <a:p>
+            <a:pPr marL="285750" indent="-285750">
+              <a:buFont typeface="Arial" panose="020B0604020202020204" pitchFamily="34" charset="0"/>
+              <a:buChar char="•"/>
+            </a:pPr>
+            <a:endParaRPr lang="en-GB" dirty="0"/>
+          </a:p>
+          <a:p>
+            <a:pPr marL="285750" indent="-285750">
+              <a:buFont typeface="Arial" panose="020B0604020202020204" pitchFamily="34" charset="0"/>
+              <a:buChar char="•"/>
+            </a:pPr>
+            <a:r>
+              <a:rPr lang="en-GB" b="1" dirty="0"/>
+              <a:t>feature selection</a:t>
+            </a:r>
+            <a:r>
+              <a:rPr lang="en-GB" dirty="0"/>
+              <a:t> in machine learning: filter-based feature selection methods use different statistical tests to determine the feature importance</a:t>
+            </a:r>
+          </a:p>
+        </p:txBody>
+      </p:sp>
+      <p:sp>
+        <p:nvSpPr>
+          <p:cNvPr id="10" name="TextBox 9">
+            <a:extLst>
+              <a:ext uri="{FF2B5EF4-FFF2-40B4-BE49-F238E27FC236}">
+                <a16:creationId xmlns:a16="http://schemas.microsoft.com/office/drawing/2014/main" id="{272A165C-5594-5908-8767-2CB099F77B68}"/>
+              </a:ext>
+            </a:extLst>
+          </p:cNvPr>
+          <p:cNvSpPr txBox="1"/>
+          <p:nvPr/>
+        </p:nvSpPr>
+        <p:spPr>
+          <a:xfrm>
+            <a:off x="503853" y="531845"/>
+            <a:ext cx="11243388" cy="830997"/>
+          </a:xfrm>
+          <a:prstGeom prst="rect">
+            <a:avLst/>
+          </a:prstGeom>
+          <a:noFill/>
+        </p:spPr>
+        <p:txBody>
+          <a:bodyPr wrap="square" rtlCol="0">
+            <a:spAutoFit/>
+          </a:bodyPr>
+          <a:lstStyle/>
+          <a:p>
+            <a:r>
+              <a:rPr lang="en-GB" sz="2400" b="1" dirty="0"/>
+              <a:t>Hypothesis testing</a:t>
+            </a:r>
+          </a:p>
+          <a:p>
+            <a:endParaRPr lang="en-GB" sz="2400" b="1" dirty="0"/>
+          </a:p>
+        </p:txBody>
+      </p:sp>
+    </p:spTree>
+    <p:extLst>
+      <p:ext uri="{BB962C8B-B14F-4D97-AF65-F5344CB8AC3E}">
+        <p14:creationId xmlns:p14="http://schemas.microsoft.com/office/powerpoint/2010/main" val="2676199308"/>
       </p:ext>
     </p:extLst>
   </p:cSld>
@@ -18538,7 +18965,7 @@
         <p:spPr>
           <a:xfrm>
             <a:off x="503853" y="531845"/>
-            <a:ext cx="11243388" cy="1569660"/>
+            <a:ext cx="11243388" cy="1292662"/>
           </a:xfrm>
           <a:prstGeom prst="rect">
             <a:avLst/>
@@ -18576,9 +19003,6 @@
               </a:rPr>
               <a:t>: the average outcome we expect if we run an experiment many times.</a:t>
             </a:r>
-          </a:p>
-          <a:p>
-            <a:endParaRPr lang="en-GB" b="1" dirty="0"/>
           </a:p>
           <a:p>
             <a:endParaRPr lang="en-GB" b="1" dirty="0"/>

</xml_diff>